<commit_message>
Update prerequisites and logo
</commit_message>
<xml_diff>
--- a/slides/private-links.pptx
+++ b/slides/private-links.pptx
@@ -5,16 +5,15 @@
     <p:sldMasterId id="2147483660" r:id="rId1"/>
   </p:sldMasterIdLst>
   <p:notesMasterIdLst>
-    <p:notesMasterId r:id="rId9"/>
+    <p:notesMasterId r:id="rId8"/>
   </p:notesMasterIdLst>
   <p:sldIdLst>
     <p:sldId id="2076136299" r:id="rId2"/>
-    <p:sldId id="2076136326" r:id="rId3"/>
-    <p:sldId id="301" r:id="rId4"/>
-    <p:sldId id="2076136325" r:id="rId5"/>
-    <p:sldId id="260" r:id="rId6"/>
-    <p:sldId id="259" r:id="rId7"/>
-    <p:sldId id="2076136302" r:id="rId8"/>
+    <p:sldId id="301" r:id="rId3"/>
+    <p:sldId id="2076136325" r:id="rId4"/>
+    <p:sldId id="260" r:id="rId5"/>
+    <p:sldId id="259" r:id="rId6"/>
+    <p:sldId id="2076136302" r:id="rId7"/>
   </p:sldIdLst>
   <p:sldSz cx="12192000" cy="6858000"/>
   <p:notesSz cx="6858000" cy="9144000"/>
@@ -203,7 +202,7 @@
           <a:p>
             <a:fld id="{39ECB77B-8C2F-499B-AE9C-A56E6D14A93C}" type="datetimeFigureOut">
               <a:rPr lang="nb-NO" smtClean="0"/>
-              <a:t>29.05.2023</a:t>
+              <a:t>31.05.2023</a:t>
             </a:fld>
             <a:endParaRPr lang="nb-NO"/>
           </a:p>
@@ -616,6 +615,224 @@
 </file>
 
 <file path=ppt/notesSlides/notesSlide2.xml><?xml version="1.0" encoding="utf-8"?>
+<p:notes xmlns:a="http://schemas.openxmlformats.org/drawingml/2006/main" xmlns:r="http://schemas.openxmlformats.org/officeDocument/2006/relationships" xmlns:p="http://schemas.openxmlformats.org/presentationml/2006/main" showMasterSp="0" showMasterPhAnim="0">
+  <p:cSld>
+    <p:spTree>
+      <p:nvGrpSpPr>
+        <p:cNvPr id="1" name="Shape 64"/>
+        <p:cNvGrpSpPr/>
+        <p:nvPr/>
+      </p:nvGrpSpPr>
+      <p:grpSpPr>
+        <a:xfrm>
+          <a:off x="0" y="0"/>
+          <a:ext cx="0" cy="0"/>
+          <a:chOff x="0" y="0"/>
+          <a:chExt cx="0" cy="0"/>
+        </a:xfrm>
+      </p:grpSpPr>
+      <p:sp>
+        <p:nvSpPr>
+          <p:cNvPr id="65" name="Google Shape;65;g7fd950372b_1_3:notes"/>
+          <p:cNvSpPr>
+            <a:spLocks noGrp="1" noRot="1" noChangeAspect="1"/>
+          </p:cNvSpPr>
+          <p:nvPr>
+            <p:ph type="sldImg" idx="2"/>
+          </p:nvPr>
+        </p:nvSpPr>
+        <p:spPr>
+          <a:xfrm>
+            <a:off x="381000" y="685800"/>
+            <a:ext cx="6096000" cy="3429000"/>
+          </a:xfrm>
+          <a:custGeom>
+            <a:avLst/>
+            <a:gdLst/>
+            <a:ahLst/>
+            <a:cxnLst/>
+            <a:rect l="l" t="t" r="r" b="b"/>
+            <a:pathLst>
+              <a:path w="120000" h="120000" extrusionOk="0">
+                <a:moveTo>
+                  <a:pt x="0" y="0"/>
+                </a:moveTo>
+                <a:lnTo>
+                  <a:pt x="120000" y="0"/>
+                </a:lnTo>
+                <a:lnTo>
+                  <a:pt x="120000" y="120000"/>
+                </a:lnTo>
+                <a:lnTo>
+                  <a:pt x="0" y="120000"/>
+                </a:lnTo>
+                <a:close/>
+              </a:path>
+            </a:pathLst>
+          </a:custGeom>
+        </p:spPr>
+      </p:sp>
+      <p:sp>
+        <p:nvSpPr>
+          <p:cNvPr id="66" name="Google Shape;66;g7fd950372b_1_3:notes"/>
+          <p:cNvSpPr txBox="1">
+            <a:spLocks noGrp="1"/>
+          </p:cNvSpPr>
+          <p:nvPr>
+            <p:ph type="body" idx="1"/>
+          </p:nvPr>
+        </p:nvSpPr>
+        <p:spPr>
+          <a:xfrm>
+            <a:off x="685800" y="4343400"/>
+            <a:ext cx="5486400" cy="4114800"/>
+          </a:xfrm>
+          <a:prstGeom prst="rect">
+            <a:avLst/>
+          </a:prstGeom>
+        </p:spPr>
+        <p:txBody>
+          <a:bodyPr spcFirstLastPara="1" wrap="square" lIns="91425" tIns="91425" rIns="91425" bIns="91425" anchor="t" anchorCtr="0">
+            <a:noAutofit/>
+          </a:bodyPr>
+          <a:lstStyle/>
+          <a:p>
+            <a:pPr marL="0" lvl="0" indent="0" algn="l" rtl="0">
+              <a:spcBef>
+                <a:spcPts val="0"/>
+              </a:spcBef>
+              <a:spcAft>
+                <a:spcPts val="0"/>
+              </a:spcAft>
+              <a:buNone/>
+            </a:pPr>
+            <a:endParaRPr/>
+          </a:p>
+        </p:txBody>
+      </p:sp>
+    </p:spTree>
+    <p:extLst>
+      <p:ext uri="{BB962C8B-B14F-4D97-AF65-F5344CB8AC3E}">
+        <p14:creationId xmlns:p14="http://schemas.microsoft.com/office/powerpoint/2010/main" val="172796591"/>
+      </p:ext>
+    </p:extLst>
+  </p:cSld>
+  <p:clrMapOvr>
+    <a:masterClrMapping/>
+  </p:clrMapOvr>
+</p:notes>
+</file>
+
+<file path=ppt/notesSlides/notesSlide3.xml><?xml version="1.0" encoding="utf-8"?>
+<p:notes xmlns:a="http://schemas.openxmlformats.org/drawingml/2006/main" xmlns:r="http://schemas.openxmlformats.org/officeDocument/2006/relationships" xmlns:p="http://schemas.openxmlformats.org/presentationml/2006/main" showMasterSp="0" showMasterPhAnim="0">
+  <p:cSld>
+    <p:spTree>
+      <p:nvGrpSpPr>
+        <p:cNvPr id="1" name="Shape 64"/>
+        <p:cNvGrpSpPr/>
+        <p:nvPr/>
+      </p:nvGrpSpPr>
+      <p:grpSpPr>
+        <a:xfrm>
+          <a:off x="0" y="0"/>
+          <a:ext cx="0" cy="0"/>
+          <a:chOff x="0" y="0"/>
+          <a:chExt cx="0" cy="0"/>
+        </a:xfrm>
+      </p:grpSpPr>
+      <p:sp>
+        <p:nvSpPr>
+          <p:cNvPr id="65" name="Google Shape;65;g7fd950372b_1_3:notes"/>
+          <p:cNvSpPr>
+            <a:spLocks noGrp="1" noRot="1" noChangeAspect="1"/>
+          </p:cNvSpPr>
+          <p:nvPr>
+            <p:ph type="sldImg" idx="2"/>
+          </p:nvPr>
+        </p:nvSpPr>
+        <p:spPr>
+          <a:xfrm>
+            <a:off x="381000" y="685800"/>
+            <a:ext cx="6096000" cy="3429000"/>
+          </a:xfrm>
+          <a:custGeom>
+            <a:avLst/>
+            <a:gdLst/>
+            <a:ahLst/>
+            <a:cxnLst/>
+            <a:rect l="l" t="t" r="r" b="b"/>
+            <a:pathLst>
+              <a:path w="120000" h="120000" extrusionOk="0">
+                <a:moveTo>
+                  <a:pt x="0" y="0"/>
+                </a:moveTo>
+                <a:lnTo>
+                  <a:pt x="120000" y="0"/>
+                </a:lnTo>
+                <a:lnTo>
+                  <a:pt x="120000" y="120000"/>
+                </a:lnTo>
+                <a:lnTo>
+                  <a:pt x="0" y="120000"/>
+                </a:lnTo>
+                <a:close/>
+              </a:path>
+            </a:pathLst>
+          </a:custGeom>
+        </p:spPr>
+      </p:sp>
+      <p:sp>
+        <p:nvSpPr>
+          <p:cNvPr id="66" name="Google Shape;66;g7fd950372b_1_3:notes"/>
+          <p:cNvSpPr txBox="1">
+            <a:spLocks noGrp="1"/>
+          </p:cNvSpPr>
+          <p:nvPr>
+            <p:ph type="body" idx="1"/>
+          </p:nvPr>
+        </p:nvSpPr>
+        <p:spPr>
+          <a:xfrm>
+            <a:off x="685800" y="4343400"/>
+            <a:ext cx="5486400" cy="4114800"/>
+          </a:xfrm>
+          <a:prstGeom prst="rect">
+            <a:avLst/>
+          </a:prstGeom>
+        </p:spPr>
+        <p:txBody>
+          <a:bodyPr spcFirstLastPara="1" wrap="square" lIns="91425" tIns="91425" rIns="91425" bIns="91425" anchor="t" anchorCtr="0">
+            <a:noAutofit/>
+          </a:bodyPr>
+          <a:lstStyle/>
+          <a:p>
+            <a:pPr marL="0" lvl="0" indent="0" algn="l" rtl="0">
+              <a:spcBef>
+                <a:spcPts val="0"/>
+              </a:spcBef>
+              <a:spcAft>
+                <a:spcPts val="0"/>
+              </a:spcAft>
+              <a:buNone/>
+            </a:pPr>
+            <a:endParaRPr dirty="0"/>
+          </a:p>
+        </p:txBody>
+      </p:sp>
+    </p:spTree>
+    <p:extLst>
+      <p:ext uri="{BB962C8B-B14F-4D97-AF65-F5344CB8AC3E}">
+        <p14:creationId xmlns:p14="http://schemas.microsoft.com/office/powerpoint/2010/main" val="2849217478"/>
+      </p:ext>
+    </p:extLst>
+  </p:cSld>
+  <p:clrMapOvr>
+    <a:masterClrMapping/>
+  </p:clrMapOvr>
+</p:notes>
+</file>
+
+<file path=ppt/notesSlides/notesSlide4.xml><?xml version="1.0" encoding="utf-8"?>
 <p:notes xmlns:a="http://schemas.openxmlformats.org/drawingml/2006/main" xmlns:r="http://schemas.openxmlformats.org/officeDocument/2006/relationships" xmlns:p="http://schemas.openxmlformats.org/presentationml/2006/main">
   <p:cSld>
     <p:spTree>
@@ -727,369 +944,7 @@
                 <a:tabLst/>
                 <a:defRPr/>
               </a:pPr>
-              <a:t>2</a:t>
-            </a:fld>
-            <a:endParaRPr kumimoji="0" lang="en-US" sz="1200" b="0" i="0" u="none" strike="noStrike" kern="1200" cap="none" spc="0" normalizeH="0" baseline="0" noProof="0">
-              <a:ln>
-                <a:noFill/>
-              </a:ln>
-              <a:solidFill>
-                <a:prstClr val="black"/>
-              </a:solidFill>
-              <a:effectLst/>
-              <a:uLnTx/>
-              <a:uFillTx/>
-              <a:latin typeface="Calibri" panose="020F0502020204030204"/>
-              <a:ea typeface="+mn-ea"/>
-              <a:cs typeface="+mn-cs"/>
-            </a:endParaRPr>
-          </a:p>
-        </p:txBody>
-      </p:sp>
-    </p:spTree>
-    <p:extLst>
-      <p:ext uri="{BB962C8B-B14F-4D97-AF65-F5344CB8AC3E}">
-        <p14:creationId xmlns:p14="http://schemas.microsoft.com/office/powerpoint/2010/main" val="3672883733"/>
-      </p:ext>
-    </p:extLst>
-  </p:cSld>
-  <p:clrMapOvr>
-    <a:masterClrMapping/>
-  </p:clrMapOvr>
-</p:notes>
-</file>
-
-<file path=ppt/notesSlides/notesSlide3.xml><?xml version="1.0" encoding="utf-8"?>
-<p:notes xmlns:a="http://schemas.openxmlformats.org/drawingml/2006/main" xmlns:r="http://schemas.openxmlformats.org/officeDocument/2006/relationships" xmlns:p="http://schemas.openxmlformats.org/presentationml/2006/main" showMasterSp="0" showMasterPhAnim="0">
-  <p:cSld>
-    <p:spTree>
-      <p:nvGrpSpPr>
-        <p:cNvPr id="1" name="Shape 64"/>
-        <p:cNvGrpSpPr/>
-        <p:nvPr/>
-      </p:nvGrpSpPr>
-      <p:grpSpPr>
-        <a:xfrm>
-          <a:off x="0" y="0"/>
-          <a:ext cx="0" cy="0"/>
-          <a:chOff x="0" y="0"/>
-          <a:chExt cx="0" cy="0"/>
-        </a:xfrm>
-      </p:grpSpPr>
-      <p:sp>
-        <p:nvSpPr>
-          <p:cNvPr id="65" name="Google Shape;65;g7fd950372b_1_3:notes"/>
-          <p:cNvSpPr>
-            <a:spLocks noGrp="1" noRot="1" noChangeAspect="1"/>
-          </p:cNvSpPr>
-          <p:nvPr>
-            <p:ph type="sldImg" idx="2"/>
-          </p:nvPr>
-        </p:nvSpPr>
-        <p:spPr>
-          <a:xfrm>
-            <a:off x="381000" y="685800"/>
-            <a:ext cx="6096000" cy="3429000"/>
-          </a:xfrm>
-          <a:custGeom>
-            <a:avLst/>
-            <a:gdLst/>
-            <a:ahLst/>
-            <a:cxnLst/>
-            <a:rect l="l" t="t" r="r" b="b"/>
-            <a:pathLst>
-              <a:path w="120000" h="120000" extrusionOk="0">
-                <a:moveTo>
-                  <a:pt x="0" y="0"/>
-                </a:moveTo>
-                <a:lnTo>
-                  <a:pt x="120000" y="0"/>
-                </a:lnTo>
-                <a:lnTo>
-                  <a:pt x="120000" y="120000"/>
-                </a:lnTo>
-                <a:lnTo>
-                  <a:pt x="0" y="120000"/>
-                </a:lnTo>
-                <a:close/>
-              </a:path>
-            </a:pathLst>
-          </a:custGeom>
-        </p:spPr>
-      </p:sp>
-      <p:sp>
-        <p:nvSpPr>
-          <p:cNvPr id="66" name="Google Shape;66;g7fd950372b_1_3:notes"/>
-          <p:cNvSpPr txBox="1">
-            <a:spLocks noGrp="1"/>
-          </p:cNvSpPr>
-          <p:nvPr>
-            <p:ph type="body" idx="1"/>
-          </p:nvPr>
-        </p:nvSpPr>
-        <p:spPr>
-          <a:xfrm>
-            <a:off x="685800" y="4343400"/>
-            <a:ext cx="5486400" cy="4114800"/>
-          </a:xfrm>
-          <a:prstGeom prst="rect">
-            <a:avLst/>
-          </a:prstGeom>
-        </p:spPr>
-        <p:txBody>
-          <a:bodyPr spcFirstLastPara="1" wrap="square" lIns="91425" tIns="91425" rIns="91425" bIns="91425" anchor="t" anchorCtr="0">
-            <a:noAutofit/>
-          </a:bodyPr>
-          <a:lstStyle/>
-          <a:p>
-            <a:pPr marL="0" lvl="0" indent="0" algn="l" rtl="0">
-              <a:spcBef>
-                <a:spcPts val="0"/>
-              </a:spcBef>
-              <a:spcAft>
-                <a:spcPts val="0"/>
-              </a:spcAft>
-              <a:buNone/>
-            </a:pPr>
-            <a:endParaRPr/>
-          </a:p>
-        </p:txBody>
-      </p:sp>
-    </p:spTree>
-    <p:extLst>
-      <p:ext uri="{BB962C8B-B14F-4D97-AF65-F5344CB8AC3E}">
-        <p14:creationId xmlns:p14="http://schemas.microsoft.com/office/powerpoint/2010/main" val="172796591"/>
-      </p:ext>
-    </p:extLst>
-  </p:cSld>
-  <p:clrMapOvr>
-    <a:masterClrMapping/>
-  </p:clrMapOvr>
-</p:notes>
-</file>
-
-<file path=ppt/notesSlides/notesSlide4.xml><?xml version="1.0" encoding="utf-8"?>
-<p:notes xmlns:a="http://schemas.openxmlformats.org/drawingml/2006/main" xmlns:r="http://schemas.openxmlformats.org/officeDocument/2006/relationships" xmlns:p="http://schemas.openxmlformats.org/presentationml/2006/main" showMasterSp="0" showMasterPhAnim="0">
-  <p:cSld>
-    <p:spTree>
-      <p:nvGrpSpPr>
-        <p:cNvPr id="1" name="Shape 64"/>
-        <p:cNvGrpSpPr/>
-        <p:nvPr/>
-      </p:nvGrpSpPr>
-      <p:grpSpPr>
-        <a:xfrm>
-          <a:off x="0" y="0"/>
-          <a:ext cx="0" cy="0"/>
-          <a:chOff x="0" y="0"/>
-          <a:chExt cx="0" cy="0"/>
-        </a:xfrm>
-      </p:grpSpPr>
-      <p:sp>
-        <p:nvSpPr>
-          <p:cNvPr id="65" name="Google Shape;65;g7fd950372b_1_3:notes"/>
-          <p:cNvSpPr>
-            <a:spLocks noGrp="1" noRot="1" noChangeAspect="1"/>
-          </p:cNvSpPr>
-          <p:nvPr>
-            <p:ph type="sldImg" idx="2"/>
-          </p:nvPr>
-        </p:nvSpPr>
-        <p:spPr>
-          <a:xfrm>
-            <a:off x="381000" y="685800"/>
-            <a:ext cx="6096000" cy="3429000"/>
-          </a:xfrm>
-          <a:custGeom>
-            <a:avLst/>
-            <a:gdLst/>
-            <a:ahLst/>
-            <a:cxnLst/>
-            <a:rect l="l" t="t" r="r" b="b"/>
-            <a:pathLst>
-              <a:path w="120000" h="120000" extrusionOk="0">
-                <a:moveTo>
-                  <a:pt x="0" y="0"/>
-                </a:moveTo>
-                <a:lnTo>
-                  <a:pt x="120000" y="0"/>
-                </a:lnTo>
-                <a:lnTo>
-                  <a:pt x="120000" y="120000"/>
-                </a:lnTo>
-                <a:lnTo>
-                  <a:pt x="0" y="120000"/>
-                </a:lnTo>
-                <a:close/>
-              </a:path>
-            </a:pathLst>
-          </a:custGeom>
-        </p:spPr>
-      </p:sp>
-      <p:sp>
-        <p:nvSpPr>
-          <p:cNvPr id="66" name="Google Shape;66;g7fd950372b_1_3:notes"/>
-          <p:cNvSpPr txBox="1">
-            <a:spLocks noGrp="1"/>
-          </p:cNvSpPr>
-          <p:nvPr>
-            <p:ph type="body" idx="1"/>
-          </p:nvPr>
-        </p:nvSpPr>
-        <p:spPr>
-          <a:xfrm>
-            <a:off x="685800" y="4343400"/>
-            <a:ext cx="5486400" cy="4114800"/>
-          </a:xfrm>
-          <a:prstGeom prst="rect">
-            <a:avLst/>
-          </a:prstGeom>
-        </p:spPr>
-        <p:txBody>
-          <a:bodyPr spcFirstLastPara="1" wrap="square" lIns="91425" tIns="91425" rIns="91425" bIns="91425" anchor="t" anchorCtr="0">
-            <a:noAutofit/>
-          </a:bodyPr>
-          <a:lstStyle/>
-          <a:p>
-            <a:pPr marL="0" lvl="0" indent="0" algn="l" rtl="0">
-              <a:spcBef>
-                <a:spcPts val="0"/>
-              </a:spcBef>
-              <a:spcAft>
-                <a:spcPts val="0"/>
-              </a:spcAft>
-              <a:buNone/>
-            </a:pPr>
-            <a:endParaRPr dirty="0"/>
-          </a:p>
-        </p:txBody>
-      </p:sp>
-    </p:spTree>
-    <p:extLst>
-      <p:ext uri="{BB962C8B-B14F-4D97-AF65-F5344CB8AC3E}">
-        <p14:creationId xmlns:p14="http://schemas.microsoft.com/office/powerpoint/2010/main" val="2849217478"/>
-      </p:ext>
-    </p:extLst>
-  </p:cSld>
-  <p:clrMapOvr>
-    <a:masterClrMapping/>
-  </p:clrMapOvr>
-</p:notes>
-</file>
-
-<file path=ppt/notesSlides/notesSlide5.xml><?xml version="1.0" encoding="utf-8"?>
-<p:notes xmlns:a="http://schemas.openxmlformats.org/drawingml/2006/main" xmlns:r="http://schemas.openxmlformats.org/officeDocument/2006/relationships" xmlns:p="http://schemas.openxmlformats.org/presentationml/2006/main">
-  <p:cSld>
-    <p:spTree>
-      <p:nvGrpSpPr>
-        <p:cNvPr id="1" name=""/>
-        <p:cNvGrpSpPr/>
-        <p:nvPr/>
-      </p:nvGrpSpPr>
-      <p:grpSpPr>
-        <a:xfrm>
-          <a:off x="0" y="0"/>
-          <a:ext cx="0" cy="0"/>
-          <a:chOff x="0" y="0"/>
-          <a:chExt cx="0" cy="0"/>
-        </a:xfrm>
-      </p:grpSpPr>
-      <p:sp>
-        <p:nvSpPr>
-          <p:cNvPr id="2" name="Slide Image Placeholder 1"/>
-          <p:cNvSpPr>
-            <a:spLocks noGrp="1" noRot="1" noChangeAspect="1"/>
-          </p:cNvSpPr>
-          <p:nvPr>
-            <p:ph type="sldImg"/>
-          </p:nvPr>
-        </p:nvSpPr>
-        <p:spPr/>
-      </p:sp>
-      <p:sp>
-        <p:nvSpPr>
-          <p:cNvPr id="3" name="Notes Placeholder 2"/>
-          <p:cNvSpPr>
-            <a:spLocks noGrp="1"/>
-          </p:cNvSpPr>
-          <p:nvPr>
-            <p:ph type="body" idx="1"/>
-          </p:nvPr>
-        </p:nvSpPr>
-        <p:spPr/>
-        <p:txBody>
-          <a:bodyPr/>
-          <a:lstStyle/>
-          <a:p>
-            <a:endParaRPr lang="nb-NO" dirty="0"/>
-          </a:p>
-        </p:txBody>
-      </p:sp>
-      <p:sp>
-        <p:nvSpPr>
-          <p:cNvPr id="4" name="Slide Number Placeholder 3"/>
-          <p:cNvSpPr>
-            <a:spLocks noGrp="1"/>
-          </p:cNvSpPr>
-          <p:nvPr>
-            <p:ph type="sldNum" sz="quarter" idx="5"/>
-          </p:nvPr>
-        </p:nvSpPr>
-        <p:spPr/>
-        <p:txBody>
-          <a:bodyPr/>
-          <a:lstStyle/>
-          <a:p>
-            <a:pPr marL="0" marR="0" lvl="0" indent="0" algn="r" defTabSz="914400" rtl="0" eaLnBrk="1" fontAlgn="auto" latinLnBrk="0" hangingPunct="1">
-              <a:lnSpc>
-                <a:spcPct val="100000"/>
-              </a:lnSpc>
-              <a:spcBef>
-                <a:spcPts val="0"/>
-              </a:spcBef>
-              <a:spcAft>
-                <a:spcPts val="0"/>
-              </a:spcAft>
-              <a:buClrTx/>
-              <a:buSzTx/>
-              <a:buFontTx/>
-              <a:buNone/>
-              <a:tabLst/>
-              <a:defRPr/>
-            </a:pPr>
-            <a:fld id="{00A560F4-8102-4EC4-BB24-179BCBD2EB8E}" type="slidenum">
-              <a:rPr kumimoji="0" lang="en-US" sz="1200" b="0" i="0" u="none" strike="noStrike" kern="1200" cap="none" spc="0" normalizeH="0" baseline="0" noProof="0" smtClean="0">
-                <a:ln>
-                  <a:noFill/>
-                </a:ln>
-                <a:solidFill>
-                  <a:prstClr val="black"/>
-                </a:solidFill>
-                <a:effectLst/>
-                <a:uLnTx/>
-                <a:uFillTx/>
-                <a:latin typeface="Calibri" panose="020F0502020204030204"/>
-                <a:ea typeface="+mn-ea"/>
-                <a:cs typeface="+mn-cs"/>
-              </a:rPr>
-              <a:pPr marL="0" marR="0" lvl="0" indent="0" algn="r" defTabSz="914400" rtl="0" eaLnBrk="1" fontAlgn="auto" latinLnBrk="0" hangingPunct="1">
-                <a:lnSpc>
-                  <a:spcPct val="100000"/>
-                </a:lnSpc>
-                <a:spcBef>
-                  <a:spcPts val="0"/>
-                </a:spcBef>
-                <a:spcAft>
-                  <a:spcPts val="0"/>
-                </a:spcAft>
-                <a:buClrTx/>
-                <a:buSzTx/>
-                <a:buFontTx/>
-                <a:buNone/>
-                <a:tabLst/>
-                <a:defRPr/>
-              </a:pPr>
-              <a:t>7</a:t>
+              <a:t>6</a:t>
             </a:fld>
             <a:endParaRPr kumimoji="0" lang="en-US" sz="1200" b="0" i="0" u="none" strike="noStrike" kern="1200" cap="none" spc="0" normalizeH="0" baseline="0" noProof="0">
               <a:ln>
@@ -1268,7 +1123,7 @@
           <a:p>
             <a:fld id="{CE88D40F-0E01-46E3-A0A3-09B1E418DDBF}" type="datetimeFigureOut">
               <a:rPr lang="en-US" smtClean="0"/>
-              <a:t>5/29/2023</a:t>
+              <a:t>5/31/2023</a:t>
             </a:fld>
             <a:endParaRPr lang="en-US"/>
           </a:p>
@@ -1466,7 +1321,7 @@
           <a:p>
             <a:fld id="{CE88D40F-0E01-46E3-A0A3-09B1E418DDBF}" type="datetimeFigureOut">
               <a:rPr lang="en-US" smtClean="0"/>
-              <a:t>5/29/2023</a:t>
+              <a:t>5/31/2023</a:t>
             </a:fld>
             <a:endParaRPr lang="en-US"/>
           </a:p>
@@ -1674,7 +1529,7 @@
           <a:p>
             <a:fld id="{CE88D40F-0E01-46E3-A0A3-09B1E418DDBF}" type="datetimeFigureOut">
               <a:rPr lang="en-US" smtClean="0"/>
-              <a:t>5/29/2023</a:t>
+              <a:t>5/31/2023</a:t>
             </a:fld>
             <a:endParaRPr lang="en-US"/>
           </a:p>
@@ -2231,7 +2086,7 @@
           <a:p>
             <a:fld id="{CE88D40F-0E01-46E3-A0A3-09B1E418DDBF}" type="datetimeFigureOut">
               <a:rPr lang="en-US" smtClean="0"/>
-              <a:t>5/29/2023</a:t>
+              <a:t>5/31/2023</a:t>
             </a:fld>
             <a:endParaRPr lang="en-US"/>
           </a:p>
@@ -2506,7 +2361,7 @@
           <a:p>
             <a:fld id="{CE88D40F-0E01-46E3-A0A3-09B1E418DDBF}" type="datetimeFigureOut">
               <a:rPr lang="en-US" smtClean="0"/>
-              <a:t>5/29/2023</a:t>
+              <a:t>5/31/2023</a:t>
             </a:fld>
             <a:endParaRPr lang="en-US"/>
           </a:p>
@@ -2771,7 +2626,7 @@
           <a:p>
             <a:fld id="{CE88D40F-0E01-46E3-A0A3-09B1E418DDBF}" type="datetimeFigureOut">
               <a:rPr lang="en-US" smtClean="0"/>
-              <a:t>5/29/2023</a:t>
+              <a:t>5/31/2023</a:t>
             </a:fld>
             <a:endParaRPr lang="en-US"/>
           </a:p>
@@ -3183,7 +3038,7 @@
           <a:p>
             <a:fld id="{CE88D40F-0E01-46E3-A0A3-09B1E418DDBF}" type="datetimeFigureOut">
               <a:rPr lang="en-US" smtClean="0"/>
-              <a:t>5/29/2023</a:t>
+              <a:t>5/31/2023</a:t>
             </a:fld>
             <a:endParaRPr lang="en-US"/>
           </a:p>
@@ -3324,7 +3179,7 @@
           <a:p>
             <a:fld id="{CE88D40F-0E01-46E3-A0A3-09B1E418DDBF}" type="datetimeFigureOut">
               <a:rPr lang="en-US" smtClean="0"/>
-              <a:t>5/29/2023</a:t>
+              <a:t>5/31/2023</a:t>
             </a:fld>
             <a:endParaRPr lang="en-US"/>
           </a:p>
@@ -3437,7 +3292,7 @@
           <a:p>
             <a:fld id="{CE88D40F-0E01-46E3-A0A3-09B1E418DDBF}" type="datetimeFigureOut">
               <a:rPr lang="en-US" smtClean="0"/>
-              <a:t>5/29/2023</a:t>
+              <a:t>5/31/2023</a:t>
             </a:fld>
             <a:endParaRPr lang="en-US"/>
           </a:p>
@@ -3748,7 +3603,7 @@
           <a:p>
             <a:fld id="{CE88D40F-0E01-46E3-A0A3-09B1E418DDBF}" type="datetimeFigureOut">
               <a:rPr lang="en-US" smtClean="0"/>
-              <a:t>5/29/2023</a:t>
+              <a:t>5/31/2023</a:t>
             </a:fld>
             <a:endParaRPr lang="en-US"/>
           </a:p>
@@ -4036,7 +3891,7 @@
           <a:p>
             <a:fld id="{CE88D40F-0E01-46E3-A0A3-09B1E418DDBF}" type="datetimeFigureOut">
               <a:rPr lang="en-US" smtClean="0"/>
-              <a:t>5/29/2023</a:t>
+              <a:t>5/31/2023</a:t>
             </a:fld>
             <a:endParaRPr lang="en-US"/>
           </a:p>
@@ -4277,7 +4132,7 @@
           <a:p>
             <a:fld id="{CE88D40F-0E01-46E3-A0A3-09B1E418DDBF}" type="datetimeFigureOut">
               <a:rPr lang="en-US" smtClean="0"/>
-              <a:t>5/29/2023</a:t>
+              <a:t>5/31/2023</a:t>
             </a:fld>
             <a:endParaRPr lang="en-US"/>
           </a:p>
@@ -5317,7 +5172,7 @@
                 <a:ea typeface="JetBrains Mono" panose="02000009000000000000" pitchFamily="49" charset="0"/>
                 <a:cs typeface="JetBrains Mono" panose="02000009000000000000" pitchFamily="49" charset="0"/>
               </a:rPr>
-              <a:t>Working with Azure Private Endpoints</a:t>
+              <a:t>Working with Azure Private Links</a:t>
             </a:r>
           </a:p>
         </p:txBody>
@@ -5830,7 +5685,7 @@
               <a:rPr lang="en" sz="2000" dirty="0">
                 <a:latin typeface="Comic Sans MS" panose="030F0702030302020204" pitchFamily="66" charset="0"/>
               </a:rPr>
-              <a:t>20.06.2023</a:t>
+              <a:t>27.06.2023</a:t>
             </a:r>
             <a:endParaRPr lang="en-US" sz="2000" dirty="0">
               <a:latin typeface="Comic Sans MS" panose="030F0702030302020204" pitchFamily="66" charset="0"/>
@@ -6117,14 +5972,6 @@
 <file path=ppt/slides/slide2.xml><?xml version="1.0" encoding="utf-8"?>
 <p:sld xmlns:a="http://schemas.openxmlformats.org/drawingml/2006/main" xmlns:r="http://schemas.openxmlformats.org/officeDocument/2006/relationships" xmlns:p="http://schemas.openxmlformats.org/presentationml/2006/main">
   <p:cSld>
-    <p:bg>
-      <p:bgPr>
-        <a:solidFill>
-          <a:schemeClr val="bg1"/>
-        </a:solidFill>
-        <a:effectLst/>
-      </p:bgPr>
-    </p:bg>
     <p:spTree>
       <p:nvGrpSpPr>
         <p:cNvPr id="1" name=""/>
@@ -6139,1414 +5986,6 @@
           <a:chExt cx="0" cy="0"/>
         </a:xfrm>
       </p:grpSpPr>
-      <p:sp useBgFill="1">
-        <p:nvSpPr>
-          <p:cNvPr id="20" name="Rectangle 19">
-            <a:extLst>
-              <a:ext uri="{FF2B5EF4-FFF2-40B4-BE49-F238E27FC236}">
-                <a16:creationId xmlns:a16="http://schemas.microsoft.com/office/drawing/2014/main" id="{C4E4288A-DFC8-40A2-90E5-70E851A933AD}"/>
-              </a:ext>
-              <a:ext uri="{C183D7F6-B498-43B3-948B-1728B52AA6E4}">
-                <adec:decorative xmlns:adec="http://schemas.microsoft.com/office/drawing/2017/decorative" val="1"/>
-              </a:ext>
-            </a:extLst>
-          </p:cNvPr>
-          <p:cNvSpPr>
-            <a:spLocks noGrp="1" noRot="1" noChangeAspect="1" noMove="1" noResize="1" noEditPoints="1" noAdjustHandles="1" noChangeArrowheads="1" noChangeShapeType="1" noTextEdit="1"/>
-          </p:cNvSpPr>
-          <p:nvPr>
-            <p:extLst>
-              <p:ext uri="{386F3935-93C4-4BCD-93E2-E3B085C9AB24}">
-                <p16:designElem xmlns:p16="http://schemas.microsoft.com/office/powerpoint/2015/main" val="1"/>
-              </p:ext>
-            </p:extLst>
-          </p:nvPr>
-        </p:nvSpPr>
-        <p:spPr>
-          <a:xfrm>
-            <a:off x="0" y="0"/>
-            <a:ext cx="12192000" cy="6858000"/>
-          </a:xfrm>
-          <a:prstGeom prst="rect">
-            <a:avLst/>
-          </a:prstGeom>
-          <a:ln>
-            <a:noFill/>
-          </a:ln>
-        </p:spPr>
-        <p:style>
-          <a:lnRef idx="2">
-            <a:schemeClr val="accent1">
-              <a:shade val="50000"/>
-            </a:schemeClr>
-          </a:lnRef>
-          <a:fillRef idx="1">
-            <a:schemeClr val="accent1"/>
-          </a:fillRef>
-          <a:effectRef idx="0">
-            <a:schemeClr val="accent1"/>
-          </a:effectRef>
-          <a:fontRef idx="minor">
-            <a:schemeClr val="lt1"/>
-          </a:fontRef>
-        </p:style>
-        <p:txBody>
-          <a:bodyPr rtlCol="0" anchor="ctr"/>
-          <a:lstStyle/>
-          <a:p>
-            <a:pPr marL="0" marR="0" lvl="0" indent="0" algn="ctr" defTabSz="914400" rtl="0" eaLnBrk="1" fontAlgn="auto" latinLnBrk="0" hangingPunct="1">
-              <a:lnSpc>
-                <a:spcPct val="100000"/>
-              </a:lnSpc>
-              <a:spcBef>
-                <a:spcPts val="0"/>
-              </a:spcBef>
-              <a:spcAft>
-                <a:spcPts val="0"/>
-              </a:spcAft>
-              <a:buClrTx/>
-              <a:buSzTx/>
-              <a:buFontTx/>
-              <a:buNone/>
-              <a:tabLst/>
-              <a:defRPr/>
-            </a:pPr>
-            <a:endParaRPr kumimoji="0" lang="en-US" sz="1800" b="0" i="0" u="none" strike="noStrike" kern="1200" cap="none" spc="0" normalizeH="0" baseline="0" noProof="0">
-              <a:ln>
-                <a:noFill/>
-              </a:ln>
-              <a:solidFill>
-                <a:prstClr val="white"/>
-              </a:solidFill>
-              <a:effectLst/>
-              <a:uLnTx/>
-              <a:uFillTx/>
-              <a:latin typeface="Calibri" panose="020F0502020204030204"/>
-              <a:ea typeface="+mn-ea"/>
-              <a:cs typeface="+mn-cs"/>
-            </a:endParaRPr>
-          </a:p>
-        </p:txBody>
-      </p:sp>
-      <p:grpSp>
-        <p:nvGrpSpPr>
-          <p:cNvPr id="22" name="Group 21">
-            <a:extLst>
-              <a:ext uri="{FF2B5EF4-FFF2-40B4-BE49-F238E27FC236}">
-                <a16:creationId xmlns:a16="http://schemas.microsoft.com/office/drawing/2014/main" id="{B63C2D82-D4FA-4A37-BB01-1E7B21E4FF20}"/>
-              </a:ext>
-              <a:ext uri="{C183D7F6-B498-43B3-948B-1728B52AA6E4}">
-                <adec:decorative xmlns:adec="http://schemas.microsoft.com/office/drawing/2017/decorative" val="1"/>
-              </a:ext>
-            </a:extLst>
-          </p:cNvPr>
-          <p:cNvGrpSpPr>
-            <a:grpSpLocks noGrp="1" noUngrp="1" noRot="1" noChangeAspect="1" noMove="1" noResize="1"/>
-          </p:cNvGrpSpPr>
-          <p:nvPr>
-            <p:extLst>
-              <p:ext uri="{386F3935-93C4-4BCD-93E2-E3B085C9AB24}">
-                <p16:designElem xmlns:p16="http://schemas.microsoft.com/office/powerpoint/2015/main" val="1"/>
-              </p:ext>
-            </p:extLst>
-          </p:nvPr>
-        </p:nvGrpSpPr>
-        <p:grpSpPr>
-          <a:xfrm>
-            <a:off x="965199" y="634058"/>
-            <a:ext cx="1128382" cy="847206"/>
-            <a:chOff x="5307830" y="325570"/>
-            <a:chExt cx="1128382" cy="847206"/>
-          </a:xfrm>
-        </p:grpSpPr>
-        <p:sp>
-          <p:nvSpPr>
-            <p:cNvPr id="23" name="Freeform 5">
-              <a:extLst>
-                <a:ext uri="{FF2B5EF4-FFF2-40B4-BE49-F238E27FC236}">
-                  <a16:creationId xmlns:a16="http://schemas.microsoft.com/office/drawing/2014/main" id="{C94E7FEF-0CE9-4AC2-94BB-02230C6DC0DF}"/>
-                </a:ext>
-                <a:ext uri="{C183D7F6-B498-43B3-948B-1728B52AA6E4}">
-                  <adec:decorative xmlns:adec="http://schemas.microsoft.com/office/drawing/2017/decorative" val="1"/>
-                </a:ext>
-              </a:extLst>
-            </p:cNvPr>
-            <p:cNvSpPr>
-              <a:spLocks/>
-            </p:cNvSpPr>
-            <p:nvPr>
-              <p:extLst>
-                <p:ext uri="{386F3935-93C4-4BCD-93E2-E3B085C9AB24}">
-                  <p16:designElem xmlns:p16="http://schemas.microsoft.com/office/powerpoint/2015/main" val="1"/>
-                </p:ext>
-              </p:extLst>
-            </p:nvPr>
-          </p:nvSpPr>
-          <p:spPr bwMode="auto">
-            <a:xfrm>
-              <a:off x="5307830" y="577396"/>
-              <a:ext cx="675351" cy="595380"/>
-            </a:xfrm>
-            <a:custGeom>
-              <a:avLst/>
-              <a:gdLst>
-                <a:gd name="T0" fmla="*/ 225 w 785"/>
-                <a:gd name="T1" fmla="*/ 692 h 692"/>
-                <a:gd name="T2" fmla="*/ 177 w 785"/>
-                <a:gd name="T3" fmla="*/ 665 h 692"/>
-                <a:gd name="T4" fmla="*/ 9 w 785"/>
-                <a:gd name="T5" fmla="*/ 374 h 692"/>
-                <a:gd name="T6" fmla="*/ 9 w 785"/>
-                <a:gd name="T7" fmla="*/ 318 h 692"/>
-                <a:gd name="T8" fmla="*/ 177 w 785"/>
-                <a:gd name="T9" fmla="*/ 27 h 692"/>
-                <a:gd name="T10" fmla="*/ 225 w 785"/>
-                <a:gd name="T11" fmla="*/ 0 h 692"/>
-                <a:gd name="T12" fmla="*/ 561 w 785"/>
-                <a:gd name="T13" fmla="*/ 0 h 692"/>
-                <a:gd name="T14" fmla="*/ 609 w 785"/>
-                <a:gd name="T15" fmla="*/ 27 h 692"/>
-                <a:gd name="T16" fmla="*/ 777 w 785"/>
-                <a:gd name="T17" fmla="*/ 318 h 692"/>
-                <a:gd name="T18" fmla="*/ 777 w 785"/>
-                <a:gd name="T19" fmla="*/ 374 h 692"/>
-                <a:gd name="T20" fmla="*/ 609 w 785"/>
-                <a:gd name="T21" fmla="*/ 665 h 692"/>
-                <a:gd name="T22" fmla="*/ 561 w 785"/>
-                <a:gd name="T23" fmla="*/ 692 h 692"/>
-                <a:gd name="T24" fmla="*/ 225 w 785"/>
-                <a:gd name="T25" fmla="*/ 692 h 692"/>
-              </a:gdLst>
-              <a:ahLst/>
-              <a:cxnLst>
-                <a:cxn ang="0">
-                  <a:pos x="T0" y="T1"/>
-                </a:cxn>
-                <a:cxn ang="0">
-                  <a:pos x="T2" y="T3"/>
-                </a:cxn>
-                <a:cxn ang="0">
-                  <a:pos x="T4" y="T5"/>
-                </a:cxn>
-                <a:cxn ang="0">
-                  <a:pos x="T6" y="T7"/>
-                </a:cxn>
-                <a:cxn ang="0">
-                  <a:pos x="T8" y="T9"/>
-                </a:cxn>
-                <a:cxn ang="0">
-                  <a:pos x="T10" y="T11"/>
-                </a:cxn>
-                <a:cxn ang="0">
-                  <a:pos x="T12" y="T13"/>
-                </a:cxn>
-                <a:cxn ang="0">
-                  <a:pos x="T14" y="T15"/>
-                </a:cxn>
-                <a:cxn ang="0">
-                  <a:pos x="T16" y="T17"/>
-                </a:cxn>
-                <a:cxn ang="0">
-                  <a:pos x="T18" y="T19"/>
-                </a:cxn>
-                <a:cxn ang="0">
-                  <a:pos x="T20" y="T21"/>
-                </a:cxn>
-                <a:cxn ang="0">
-                  <a:pos x="T22" y="T23"/>
-                </a:cxn>
-                <a:cxn ang="0">
-                  <a:pos x="T24" y="T25"/>
-                </a:cxn>
-              </a:cxnLst>
-              <a:rect l="0" t="0" r="r" b="b"/>
-              <a:pathLst>
-                <a:path w="785" h="692">
-                  <a:moveTo>
-                    <a:pt x="225" y="692"/>
-                  </a:moveTo>
-                  <a:cubicBezTo>
-                    <a:pt x="207" y="692"/>
-                    <a:pt x="185" y="680"/>
-                    <a:pt x="177" y="665"/>
-                  </a:cubicBezTo>
-                  <a:cubicBezTo>
-                    <a:pt x="9" y="374"/>
-                    <a:pt x="9" y="374"/>
-                    <a:pt x="9" y="374"/>
-                  </a:cubicBezTo>
-                  <a:cubicBezTo>
-                    <a:pt x="0" y="358"/>
-                    <a:pt x="0" y="334"/>
-                    <a:pt x="9" y="318"/>
-                  </a:cubicBezTo>
-                  <a:cubicBezTo>
-                    <a:pt x="177" y="27"/>
-                    <a:pt x="177" y="27"/>
-                    <a:pt x="177" y="27"/>
-                  </a:cubicBezTo>
-                  <a:cubicBezTo>
-                    <a:pt x="185" y="12"/>
-                    <a:pt x="207" y="0"/>
-                    <a:pt x="225" y="0"/>
-                  </a:cubicBezTo>
-                  <a:cubicBezTo>
-                    <a:pt x="561" y="0"/>
-                    <a:pt x="561" y="0"/>
-                    <a:pt x="561" y="0"/>
-                  </a:cubicBezTo>
-                  <a:cubicBezTo>
-                    <a:pt x="578" y="0"/>
-                    <a:pt x="600" y="12"/>
-                    <a:pt x="609" y="27"/>
-                  </a:cubicBezTo>
-                  <a:cubicBezTo>
-                    <a:pt x="777" y="318"/>
-                    <a:pt x="777" y="318"/>
-                    <a:pt x="777" y="318"/>
-                  </a:cubicBezTo>
-                  <a:cubicBezTo>
-                    <a:pt x="785" y="334"/>
-                    <a:pt x="785" y="358"/>
-                    <a:pt x="777" y="374"/>
-                  </a:cubicBezTo>
-                  <a:cubicBezTo>
-                    <a:pt x="609" y="665"/>
-                    <a:pt x="609" y="665"/>
-                    <a:pt x="609" y="665"/>
-                  </a:cubicBezTo>
-                  <a:cubicBezTo>
-                    <a:pt x="600" y="680"/>
-                    <a:pt x="578" y="692"/>
-                    <a:pt x="561" y="692"/>
-                  </a:cubicBezTo>
-                  <a:lnTo>
-                    <a:pt x="225" y="692"/>
-                  </a:lnTo>
-                  <a:close/>
-                </a:path>
-              </a:pathLst>
-            </a:custGeom>
-            <a:noFill/>
-            <a:ln w="28575" cmpd="sng">
-              <a:solidFill>
-                <a:schemeClr val="tx1"/>
-              </a:solidFill>
-            </a:ln>
-          </p:spPr>
-          <p:txBody>
-            <a:bodyPr vert="horz" wrap="square" lIns="91440" tIns="45720" rIns="91440" bIns="45720" numCol="1" anchor="t" anchorCtr="0" compatLnSpc="1">
-              <a:prstTxWarp prst="textNoShape">
-                <a:avLst/>
-              </a:prstTxWarp>
-            </a:bodyPr>
-            <a:lstStyle/>
-            <a:p>
-              <a:pPr marL="0" marR="0" lvl="0" indent="0" algn="l" defTabSz="914400" rtl="0" eaLnBrk="1" fontAlgn="auto" latinLnBrk="0" hangingPunct="1">
-                <a:lnSpc>
-                  <a:spcPct val="100000"/>
-                </a:lnSpc>
-                <a:spcBef>
-                  <a:spcPts val="0"/>
-                </a:spcBef>
-                <a:spcAft>
-                  <a:spcPts val="0"/>
-                </a:spcAft>
-                <a:buClrTx/>
-                <a:buSzTx/>
-                <a:buFontTx/>
-                <a:buNone/>
-                <a:tabLst/>
-                <a:defRPr/>
-              </a:pPr>
-              <a:endParaRPr kumimoji="0" lang="en-US" sz="1800" b="0" i="0" u="none" strike="noStrike" kern="1200" cap="none" spc="0" normalizeH="0" baseline="0" noProof="0">
-                <a:ln>
-                  <a:noFill/>
-                </a:ln>
-                <a:solidFill>
-                  <a:prstClr val="black"/>
-                </a:solidFill>
-                <a:effectLst/>
-                <a:uLnTx/>
-                <a:uFillTx/>
-                <a:latin typeface="Calibri" panose="020F0502020204030204"/>
-                <a:ea typeface="+mn-ea"/>
-                <a:cs typeface="+mn-cs"/>
-              </a:endParaRPr>
-            </a:p>
-          </p:txBody>
-        </p:sp>
-        <p:sp>
-          <p:nvSpPr>
-            <p:cNvPr id="24" name="Freeform 5">
-              <a:extLst>
-                <a:ext uri="{FF2B5EF4-FFF2-40B4-BE49-F238E27FC236}">
-                  <a16:creationId xmlns:a16="http://schemas.microsoft.com/office/drawing/2014/main" id="{EB546CC0-C1BC-48D2-8DA9-4B60283165C9}"/>
-                </a:ext>
-                <a:ext uri="{C183D7F6-B498-43B3-948B-1728B52AA6E4}">
-                  <adec:decorative xmlns:adec="http://schemas.microsoft.com/office/drawing/2017/decorative" val="1"/>
-                </a:ext>
-              </a:extLst>
-            </p:cNvPr>
-            <p:cNvSpPr>
-              <a:spLocks/>
-            </p:cNvSpPr>
-            <p:nvPr>
-              <p:extLst>
-                <p:ext uri="{386F3935-93C4-4BCD-93E2-E3B085C9AB24}">
-                  <p16:designElem xmlns:p16="http://schemas.microsoft.com/office/powerpoint/2015/main" val="1"/>
-                </p:ext>
-              </p:extLst>
-            </p:nvPr>
-          </p:nvSpPr>
-          <p:spPr bwMode="auto">
-            <a:xfrm>
-              <a:off x="5885720" y="325570"/>
-              <a:ext cx="550492" cy="485306"/>
-            </a:xfrm>
-            <a:custGeom>
-              <a:avLst/>
-              <a:gdLst>
-                <a:gd name="T0" fmla="*/ 225 w 785"/>
-                <a:gd name="T1" fmla="*/ 692 h 692"/>
-                <a:gd name="T2" fmla="*/ 177 w 785"/>
-                <a:gd name="T3" fmla="*/ 665 h 692"/>
-                <a:gd name="T4" fmla="*/ 9 w 785"/>
-                <a:gd name="T5" fmla="*/ 374 h 692"/>
-                <a:gd name="T6" fmla="*/ 9 w 785"/>
-                <a:gd name="T7" fmla="*/ 318 h 692"/>
-                <a:gd name="T8" fmla="*/ 177 w 785"/>
-                <a:gd name="T9" fmla="*/ 27 h 692"/>
-                <a:gd name="T10" fmla="*/ 225 w 785"/>
-                <a:gd name="T11" fmla="*/ 0 h 692"/>
-                <a:gd name="T12" fmla="*/ 561 w 785"/>
-                <a:gd name="T13" fmla="*/ 0 h 692"/>
-                <a:gd name="T14" fmla="*/ 609 w 785"/>
-                <a:gd name="T15" fmla="*/ 27 h 692"/>
-                <a:gd name="T16" fmla="*/ 777 w 785"/>
-                <a:gd name="T17" fmla="*/ 318 h 692"/>
-                <a:gd name="T18" fmla="*/ 777 w 785"/>
-                <a:gd name="T19" fmla="*/ 374 h 692"/>
-                <a:gd name="T20" fmla="*/ 609 w 785"/>
-                <a:gd name="T21" fmla="*/ 665 h 692"/>
-                <a:gd name="T22" fmla="*/ 561 w 785"/>
-                <a:gd name="T23" fmla="*/ 692 h 692"/>
-                <a:gd name="T24" fmla="*/ 225 w 785"/>
-                <a:gd name="T25" fmla="*/ 692 h 692"/>
-              </a:gdLst>
-              <a:ahLst/>
-              <a:cxnLst>
-                <a:cxn ang="0">
-                  <a:pos x="T0" y="T1"/>
-                </a:cxn>
-                <a:cxn ang="0">
-                  <a:pos x="T2" y="T3"/>
-                </a:cxn>
-                <a:cxn ang="0">
-                  <a:pos x="T4" y="T5"/>
-                </a:cxn>
-                <a:cxn ang="0">
-                  <a:pos x="T6" y="T7"/>
-                </a:cxn>
-                <a:cxn ang="0">
-                  <a:pos x="T8" y="T9"/>
-                </a:cxn>
-                <a:cxn ang="0">
-                  <a:pos x="T10" y="T11"/>
-                </a:cxn>
-                <a:cxn ang="0">
-                  <a:pos x="T12" y="T13"/>
-                </a:cxn>
-                <a:cxn ang="0">
-                  <a:pos x="T14" y="T15"/>
-                </a:cxn>
-                <a:cxn ang="0">
-                  <a:pos x="T16" y="T17"/>
-                </a:cxn>
-                <a:cxn ang="0">
-                  <a:pos x="T18" y="T19"/>
-                </a:cxn>
-                <a:cxn ang="0">
-                  <a:pos x="T20" y="T21"/>
-                </a:cxn>
-                <a:cxn ang="0">
-                  <a:pos x="T22" y="T23"/>
-                </a:cxn>
-                <a:cxn ang="0">
-                  <a:pos x="T24" y="T25"/>
-                </a:cxn>
-              </a:cxnLst>
-              <a:rect l="0" t="0" r="r" b="b"/>
-              <a:pathLst>
-                <a:path w="785" h="692">
-                  <a:moveTo>
-                    <a:pt x="225" y="692"/>
-                  </a:moveTo>
-                  <a:cubicBezTo>
-                    <a:pt x="207" y="692"/>
-                    <a:pt x="185" y="680"/>
-                    <a:pt x="177" y="665"/>
-                  </a:cubicBezTo>
-                  <a:cubicBezTo>
-                    <a:pt x="9" y="374"/>
-                    <a:pt x="9" y="374"/>
-                    <a:pt x="9" y="374"/>
-                  </a:cubicBezTo>
-                  <a:cubicBezTo>
-                    <a:pt x="0" y="358"/>
-                    <a:pt x="0" y="334"/>
-                    <a:pt x="9" y="318"/>
-                  </a:cubicBezTo>
-                  <a:cubicBezTo>
-                    <a:pt x="177" y="27"/>
-                    <a:pt x="177" y="27"/>
-                    <a:pt x="177" y="27"/>
-                  </a:cubicBezTo>
-                  <a:cubicBezTo>
-                    <a:pt x="185" y="12"/>
-                    <a:pt x="207" y="0"/>
-                    <a:pt x="225" y="0"/>
-                  </a:cubicBezTo>
-                  <a:cubicBezTo>
-                    <a:pt x="561" y="0"/>
-                    <a:pt x="561" y="0"/>
-                    <a:pt x="561" y="0"/>
-                  </a:cubicBezTo>
-                  <a:cubicBezTo>
-                    <a:pt x="578" y="0"/>
-                    <a:pt x="600" y="12"/>
-                    <a:pt x="609" y="27"/>
-                  </a:cubicBezTo>
-                  <a:cubicBezTo>
-                    <a:pt x="777" y="318"/>
-                    <a:pt x="777" y="318"/>
-                    <a:pt x="777" y="318"/>
-                  </a:cubicBezTo>
-                  <a:cubicBezTo>
-                    <a:pt x="785" y="334"/>
-                    <a:pt x="785" y="358"/>
-                    <a:pt x="777" y="374"/>
-                  </a:cubicBezTo>
-                  <a:cubicBezTo>
-                    <a:pt x="609" y="665"/>
-                    <a:pt x="609" y="665"/>
-                    <a:pt x="609" y="665"/>
-                  </a:cubicBezTo>
-                  <a:cubicBezTo>
-                    <a:pt x="600" y="680"/>
-                    <a:pt x="578" y="692"/>
-                    <a:pt x="561" y="692"/>
-                  </a:cubicBezTo>
-                  <a:lnTo>
-                    <a:pt x="225" y="692"/>
-                  </a:lnTo>
-                  <a:close/>
-                </a:path>
-              </a:pathLst>
-            </a:custGeom>
-            <a:noFill/>
-            <a:ln w="28575" cmpd="sng">
-              <a:solidFill>
-                <a:schemeClr val="tx1"/>
-              </a:solidFill>
-            </a:ln>
-          </p:spPr>
-          <p:txBody>
-            <a:bodyPr vert="horz" wrap="square" lIns="91440" tIns="45720" rIns="91440" bIns="45720" numCol="1" anchor="t" anchorCtr="0" compatLnSpc="1">
-              <a:prstTxWarp prst="textNoShape">
-                <a:avLst/>
-              </a:prstTxWarp>
-            </a:bodyPr>
-            <a:lstStyle/>
-            <a:p>
-              <a:pPr marL="0" marR="0" lvl="0" indent="0" algn="l" defTabSz="914400" rtl="0" eaLnBrk="1" fontAlgn="auto" latinLnBrk="0" hangingPunct="1">
-                <a:lnSpc>
-                  <a:spcPct val="100000"/>
-                </a:lnSpc>
-                <a:spcBef>
-                  <a:spcPts val="0"/>
-                </a:spcBef>
-                <a:spcAft>
-                  <a:spcPts val="0"/>
-                </a:spcAft>
-                <a:buClrTx/>
-                <a:buSzTx/>
-                <a:buFontTx/>
-                <a:buNone/>
-                <a:tabLst/>
-                <a:defRPr/>
-              </a:pPr>
-              <a:endParaRPr kumimoji="0" lang="en-US" sz="1800" b="0" i="0" u="none" strike="noStrike" kern="1200" cap="none" spc="0" normalizeH="0" baseline="0" noProof="0">
-                <a:ln>
-                  <a:noFill/>
-                </a:ln>
-                <a:solidFill>
-                  <a:prstClr val="black"/>
-                </a:solidFill>
-                <a:effectLst/>
-                <a:uLnTx/>
-                <a:uFillTx/>
-                <a:latin typeface="Calibri" panose="020F0502020204030204"/>
-                <a:ea typeface="+mn-ea"/>
-                <a:cs typeface="+mn-cs"/>
-              </a:endParaRPr>
-            </a:p>
-          </p:txBody>
-        </p:sp>
-      </p:grpSp>
-      <p:sp>
-        <p:nvSpPr>
-          <p:cNvPr id="8" name="TextBox 7">
-            <a:extLst>
-              <a:ext uri="{FF2B5EF4-FFF2-40B4-BE49-F238E27FC236}">
-                <a16:creationId xmlns:a16="http://schemas.microsoft.com/office/drawing/2014/main" id="{04CA4DF5-C512-4233-8F08-3FDA86F8239A}"/>
-              </a:ext>
-            </a:extLst>
-          </p:cNvPr>
-          <p:cNvSpPr txBox="1"/>
-          <p:nvPr/>
-        </p:nvSpPr>
-        <p:spPr>
-          <a:xfrm>
-            <a:off x="258891" y="3711157"/>
-            <a:ext cx="6100094" cy="1258645"/>
-          </a:xfrm>
-          <a:prstGeom prst="rect">
-            <a:avLst/>
-          </a:prstGeom>
-        </p:spPr>
-        <p:txBody>
-          <a:bodyPr vert="horz" lIns="91440" tIns="45720" rIns="91440" bIns="45720" rtlCol="0" anchor="b">
-            <a:normAutofit/>
-          </a:bodyPr>
-          <a:lstStyle/>
-          <a:p>
-            <a:pPr marL="0" marR="0" lvl="0" indent="0" algn="l" defTabSz="914400" rtl="0" eaLnBrk="1" fontAlgn="auto" latinLnBrk="0" hangingPunct="1">
-              <a:lnSpc>
-                <a:spcPct val="90000"/>
-              </a:lnSpc>
-              <a:spcBef>
-                <a:spcPct val="0"/>
-              </a:spcBef>
-              <a:spcAft>
-                <a:spcPts val="600"/>
-              </a:spcAft>
-              <a:buClrTx/>
-              <a:buSzTx/>
-              <a:buFontTx/>
-              <a:buNone/>
-              <a:tabLst/>
-              <a:defRPr/>
-            </a:pPr>
-            <a:r>
-              <a:rPr kumimoji="0" lang="en-US" sz="3800" b="0" i="0" u="none" strike="noStrike" kern="1200" cap="none" spc="0" normalizeH="0" baseline="0" noProof="0" dirty="0">
-                <a:ln>
-                  <a:noFill/>
-                </a:ln>
-                <a:solidFill>
-                  <a:prstClr val="black"/>
-                </a:solidFill>
-                <a:effectLst/>
-                <a:uLnTx/>
-                <a:uFillTx/>
-                <a:latin typeface="JetBrains Mono" panose="02000009000000000000" pitchFamily="49" charset="0"/>
-                <a:ea typeface="JetBrains Mono" panose="02000009000000000000" pitchFamily="49" charset="0"/>
-                <a:cs typeface="JetBrains Mono" panose="02000009000000000000" pitchFamily="49" charset="0"/>
-              </a:rPr>
-              <a:t>Working with Azure Private Endpoints</a:t>
-            </a:r>
-          </a:p>
-        </p:txBody>
-      </p:sp>
-      <p:sp>
-        <p:nvSpPr>
-          <p:cNvPr id="26" name="Freeform 5">
-            <a:extLst>
-              <a:ext uri="{FF2B5EF4-FFF2-40B4-BE49-F238E27FC236}">
-                <a16:creationId xmlns:a16="http://schemas.microsoft.com/office/drawing/2014/main" id="{BD2BFF02-DF78-4F07-B176-52514E13127D}"/>
-              </a:ext>
-              <a:ext uri="{C183D7F6-B498-43B3-948B-1728B52AA6E4}">
-                <adec:decorative xmlns:adec="http://schemas.microsoft.com/office/drawing/2017/decorative" val="1"/>
-              </a:ext>
-            </a:extLst>
-          </p:cNvPr>
-          <p:cNvSpPr>
-            <a:spLocks noGrp="1" noRot="1" noChangeAspect="1" noMove="1" noResize="1" noEditPoints="1" noAdjustHandles="1" noChangeArrowheads="1" noChangeShapeType="1" noTextEdit="1"/>
-          </p:cNvSpPr>
-          <p:nvPr>
-            <p:extLst>
-              <p:ext uri="{386F3935-93C4-4BCD-93E2-E3B085C9AB24}">
-                <p16:designElem xmlns:p16="http://schemas.microsoft.com/office/powerpoint/2015/main" val="1"/>
-              </p:ext>
-            </p:extLst>
-          </p:nvPr>
-        </p:nvSpPr>
-        <p:spPr bwMode="auto">
-          <a:xfrm>
-            <a:off x="7062174" y="1653645"/>
-            <a:ext cx="4689240" cy="4115025"/>
-          </a:xfrm>
-          <a:custGeom>
-            <a:avLst/>
-            <a:gdLst>
-              <a:gd name="T0" fmla="*/ 781 w 1099"/>
-              <a:gd name="T1" fmla="*/ 0 h 968"/>
-              <a:gd name="T2" fmla="*/ 318 w 1099"/>
-              <a:gd name="T3" fmla="*/ 0 h 968"/>
-              <a:gd name="T4" fmla="*/ 246 w 1099"/>
-              <a:gd name="T5" fmla="*/ 42 h 968"/>
-              <a:gd name="T6" fmla="*/ 15 w 1099"/>
-              <a:gd name="T7" fmla="*/ 443 h 968"/>
-              <a:gd name="T8" fmla="*/ 15 w 1099"/>
-              <a:gd name="T9" fmla="*/ 525 h 968"/>
-              <a:gd name="T10" fmla="*/ 246 w 1099"/>
-              <a:gd name="T11" fmla="*/ 926 h 968"/>
-              <a:gd name="T12" fmla="*/ 318 w 1099"/>
-              <a:gd name="T13" fmla="*/ 968 h 968"/>
-              <a:gd name="T14" fmla="*/ 781 w 1099"/>
-              <a:gd name="T15" fmla="*/ 968 h 968"/>
-              <a:gd name="T16" fmla="*/ 852 w 1099"/>
-              <a:gd name="T17" fmla="*/ 926 h 968"/>
-              <a:gd name="T18" fmla="*/ 1084 w 1099"/>
-              <a:gd name="T19" fmla="*/ 525 h 968"/>
-              <a:gd name="T20" fmla="*/ 1084 w 1099"/>
-              <a:gd name="T21" fmla="*/ 443 h 968"/>
-              <a:gd name="T22" fmla="*/ 852 w 1099"/>
-              <a:gd name="T23" fmla="*/ 42 h 968"/>
-              <a:gd name="T24" fmla="*/ 781 w 1099"/>
-              <a:gd name="T25" fmla="*/ 0 h 968"/>
-            </a:gdLst>
-            <a:ahLst/>
-            <a:cxnLst>
-              <a:cxn ang="0">
-                <a:pos x="T0" y="T1"/>
-              </a:cxn>
-              <a:cxn ang="0">
-                <a:pos x="T2" y="T3"/>
-              </a:cxn>
-              <a:cxn ang="0">
-                <a:pos x="T4" y="T5"/>
-              </a:cxn>
-              <a:cxn ang="0">
-                <a:pos x="T6" y="T7"/>
-              </a:cxn>
-              <a:cxn ang="0">
-                <a:pos x="T8" y="T9"/>
-              </a:cxn>
-              <a:cxn ang="0">
-                <a:pos x="T10" y="T11"/>
-              </a:cxn>
-              <a:cxn ang="0">
-                <a:pos x="T12" y="T13"/>
-              </a:cxn>
-              <a:cxn ang="0">
-                <a:pos x="T14" y="T15"/>
-              </a:cxn>
-              <a:cxn ang="0">
-                <a:pos x="T16" y="T17"/>
-              </a:cxn>
-              <a:cxn ang="0">
-                <a:pos x="T18" y="T19"/>
-              </a:cxn>
-              <a:cxn ang="0">
-                <a:pos x="T20" y="T21"/>
-              </a:cxn>
-              <a:cxn ang="0">
-                <a:pos x="T22" y="T23"/>
-              </a:cxn>
-              <a:cxn ang="0">
-                <a:pos x="T24" y="T25"/>
-              </a:cxn>
-            </a:cxnLst>
-            <a:rect l="0" t="0" r="r" b="b"/>
-            <a:pathLst>
-              <a:path w="1099" h="968">
-                <a:moveTo>
-                  <a:pt x="781" y="0"/>
-                </a:moveTo>
-                <a:cubicBezTo>
-                  <a:pt x="318" y="0"/>
-                  <a:pt x="318" y="0"/>
-                  <a:pt x="318" y="0"/>
-                </a:cubicBezTo>
-                <a:cubicBezTo>
-                  <a:pt x="288" y="0"/>
-                  <a:pt x="261" y="16"/>
-                  <a:pt x="246" y="42"/>
-                </a:cubicBezTo>
-                <a:cubicBezTo>
-                  <a:pt x="15" y="443"/>
-                  <a:pt x="15" y="443"/>
-                  <a:pt x="15" y="443"/>
-                </a:cubicBezTo>
-                <a:cubicBezTo>
-                  <a:pt x="0" y="468"/>
-                  <a:pt x="0" y="500"/>
-                  <a:pt x="15" y="525"/>
-                </a:cubicBezTo>
-                <a:cubicBezTo>
-                  <a:pt x="246" y="926"/>
-                  <a:pt x="246" y="926"/>
-                  <a:pt x="246" y="926"/>
-                </a:cubicBezTo>
-                <a:cubicBezTo>
-                  <a:pt x="261" y="952"/>
-                  <a:pt x="288" y="968"/>
-                  <a:pt x="318" y="968"/>
-                </a:cubicBezTo>
-                <a:cubicBezTo>
-                  <a:pt x="781" y="968"/>
-                  <a:pt x="781" y="968"/>
-                  <a:pt x="781" y="968"/>
-                </a:cubicBezTo>
-                <a:cubicBezTo>
-                  <a:pt x="810" y="968"/>
-                  <a:pt x="838" y="952"/>
-                  <a:pt x="852" y="926"/>
-                </a:cubicBezTo>
-                <a:cubicBezTo>
-                  <a:pt x="1084" y="525"/>
-                  <a:pt x="1084" y="525"/>
-                  <a:pt x="1084" y="525"/>
-                </a:cubicBezTo>
-                <a:cubicBezTo>
-                  <a:pt x="1099" y="500"/>
-                  <a:pt x="1099" y="468"/>
-                  <a:pt x="1084" y="443"/>
-                </a:cubicBezTo>
-                <a:cubicBezTo>
-                  <a:pt x="852" y="42"/>
-                  <a:pt x="852" y="42"/>
-                  <a:pt x="852" y="42"/>
-                </a:cubicBezTo>
-                <a:cubicBezTo>
-                  <a:pt x="838" y="16"/>
-                  <a:pt x="810" y="0"/>
-                  <a:pt x="781" y="0"/>
-                </a:cubicBezTo>
-                <a:close/>
-              </a:path>
-            </a:pathLst>
-          </a:custGeom>
-          <a:noFill/>
-          <a:ln w="50800" cap="flat">
-            <a:solidFill>
-              <a:schemeClr val="tx1"/>
-            </a:solidFill>
-            <a:prstDash val="solid"/>
-            <a:miter lim="800000"/>
-            <a:headEnd/>
-            <a:tailEnd/>
-          </a:ln>
-        </p:spPr>
-        <p:txBody>
-          <a:bodyPr vert="horz" wrap="square" lIns="91440" tIns="45720" rIns="91440" bIns="45720" numCol="1" anchor="t" anchorCtr="0" compatLnSpc="1">
-            <a:prstTxWarp prst="textNoShape">
-              <a:avLst/>
-            </a:prstTxWarp>
-          </a:bodyPr>
-          <a:lstStyle/>
-          <a:p>
-            <a:pPr marL="0" marR="0" lvl="0" indent="0" algn="l" defTabSz="914400" rtl="0" eaLnBrk="1" fontAlgn="auto" latinLnBrk="0" hangingPunct="1">
-              <a:lnSpc>
-                <a:spcPct val="100000"/>
-              </a:lnSpc>
-              <a:spcBef>
-                <a:spcPts val="0"/>
-              </a:spcBef>
-              <a:spcAft>
-                <a:spcPts val="0"/>
-              </a:spcAft>
-              <a:buClrTx/>
-              <a:buSzTx/>
-              <a:buFontTx/>
-              <a:buNone/>
-              <a:tabLst/>
-              <a:defRPr/>
-            </a:pPr>
-            <a:endParaRPr kumimoji="0" lang="en-US" sz="1800" b="0" i="0" u="none" strike="noStrike" kern="1200" cap="none" spc="0" normalizeH="0" baseline="0" noProof="0" dirty="0">
-              <a:ln>
-                <a:noFill/>
-              </a:ln>
-              <a:solidFill>
-                <a:prstClr val="black"/>
-              </a:solidFill>
-              <a:effectLst/>
-              <a:uLnTx/>
-              <a:uFillTx/>
-              <a:latin typeface="Calibri" panose="020F0502020204030204"/>
-              <a:ea typeface="+mn-ea"/>
-              <a:cs typeface="+mn-cs"/>
-            </a:endParaRPr>
-          </a:p>
-        </p:txBody>
-      </p:sp>
-      <p:sp>
-        <p:nvSpPr>
-          <p:cNvPr id="28" name="Freeform: Shape 27">
-            <a:extLst>
-              <a:ext uri="{FF2B5EF4-FFF2-40B4-BE49-F238E27FC236}">
-                <a16:creationId xmlns:a16="http://schemas.microsoft.com/office/drawing/2014/main" id="{0DB06EAB-7D8C-403A-86C5-B5FD79A13650}"/>
-              </a:ext>
-              <a:ext uri="{C183D7F6-B498-43B3-948B-1728B52AA6E4}">
-                <adec:decorative xmlns:adec="http://schemas.microsoft.com/office/drawing/2017/decorative" val="1"/>
-              </a:ext>
-            </a:extLst>
-          </p:cNvPr>
-          <p:cNvSpPr>
-            <a:spLocks noGrp="1" noRot="1" noChangeAspect="1" noMove="1" noResize="1" noEditPoints="1" noAdjustHandles="1" noChangeArrowheads="1" noChangeShapeType="1" noTextEdit="1"/>
-          </p:cNvSpPr>
-          <p:nvPr>
-            <p:extLst>
-              <p:ext uri="{386F3935-93C4-4BCD-93E2-E3B085C9AB24}">
-                <p16:designElem xmlns:p16="http://schemas.microsoft.com/office/powerpoint/2015/main" val="1"/>
-              </p:ext>
-            </p:extLst>
-          </p:nvPr>
-        </p:nvSpPr>
-        <p:spPr>
-          <a:xfrm>
-            <a:off x="4542865" y="634058"/>
-            <a:ext cx="3154669" cy="2796247"/>
-          </a:xfrm>
-          <a:custGeom>
-            <a:avLst/>
-            <a:gdLst>
-              <a:gd name="connsiteX0" fmla="*/ 853538 w 2991693"/>
-              <a:gd name="connsiteY0" fmla="*/ 0 h 2651787"/>
-              <a:gd name="connsiteX1" fmla="*/ 2141030 w 2991693"/>
-              <a:gd name="connsiteY1" fmla="*/ 0 h 2651787"/>
-              <a:gd name="connsiteX2" fmla="*/ 2324957 w 2991693"/>
-              <a:gd name="connsiteY2" fmla="*/ 103466 h 2651787"/>
-              <a:gd name="connsiteX3" fmla="*/ 2968702 w 2991693"/>
-              <a:gd name="connsiteY3" fmla="*/ 1218596 h 2651787"/>
-              <a:gd name="connsiteX4" fmla="*/ 2968702 w 2991693"/>
-              <a:gd name="connsiteY4" fmla="*/ 1433192 h 2651787"/>
-              <a:gd name="connsiteX5" fmla="*/ 2324957 w 2991693"/>
-              <a:gd name="connsiteY5" fmla="*/ 2548321 h 2651787"/>
-              <a:gd name="connsiteX6" fmla="*/ 2141030 w 2991693"/>
-              <a:gd name="connsiteY6" fmla="*/ 2651787 h 2651787"/>
-              <a:gd name="connsiteX7" fmla="*/ 853538 w 2991693"/>
-              <a:gd name="connsiteY7" fmla="*/ 2651787 h 2651787"/>
-              <a:gd name="connsiteX8" fmla="*/ 669612 w 2991693"/>
-              <a:gd name="connsiteY8" fmla="*/ 2548321 h 2651787"/>
-              <a:gd name="connsiteX9" fmla="*/ 25866 w 2991693"/>
-              <a:gd name="connsiteY9" fmla="*/ 1433192 h 2651787"/>
-              <a:gd name="connsiteX10" fmla="*/ 25866 w 2991693"/>
-              <a:gd name="connsiteY10" fmla="*/ 1218596 h 2651787"/>
-              <a:gd name="connsiteX11" fmla="*/ 669612 w 2991693"/>
-              <a:gd name="connsiteY11" fmla="*/ 103466 h 2651787"/>
-              <a:gd name="connsiteX12" fmla="*/ 853538 w 2991693"/>
-              <a:gd name="connsiteY12" fmla="*/ 0 h 2651787"/>
-            </a:gdLst>
-            <a:ahLst/>
-            <a:cxnLst>
-              <a:cxn ang="0">
-                <a:pos x="connsiteX0" y="connsiteY0"/>
-              </a:cxn>
-              <a:cxn ang="0">
-                <a:pos x="connsiteX1" y="connsiteY1"/>
-              </a:cxn>
-              <a:cxn ang="0">
-                <a:pos x="connsiteX2" y="connsiteY2"/>
-              </a:cxn>
-              <a:cxn ang="0">
-                <a:pos x="connsiteX3" y="connsiteY3"/>
-              </a:cxn>
-              <a:cxn ang="0">
-                <a:pos x="connsiteX4" y="connsiteY4"/>
-              </a:cxn>
-              <a:cxn ang="0">
-                <a:pos x="connsiteX5" y="connsiteY5"/>
-              </a:cxn>
-              <a:cxn ang="0">
-                <a:pos x="connsiteX6" y="connsiteY6"/>
-              </a:cxn>
-              <a:cxn ang="0">
-                <a:pos x="connsiteX7" y="connsiteY7"/>
-              </a:cxn>
-              <a:cxn ang="0">
-                <a:pos x="connsiteX8" y="connsiteY8"/>
-              </a:cxn>
-              <a:cxn ang="0">
-                <a:pos x="connsiteX9" y="connsiteY9"/>
-              </a:cxn>
-              <a:cxn ang="0">
-                <a:pos x="connsiteX10" y="connsiteY10"/>
-              </a:cxn>
-              <a:cxn ang="0">
-                <a:pos x="connsiteX11" y="connsiteY11"/>
-              </a:cxn>
-              <a:cxn ang="0">
-                <a:pos x="connsiteX12" y="connsiteY12"/>
-              </a:cxn>
-            </a:cxnLst>
-            <a:rect l="l" t="t" r="r" b="b"/>
-            <a:pathLst>
-              <a:path w="2991693" h="2651787">
-                <a:moveTo>
-                  <a:pt x="853538" y="0"/>
-                </a:moveTo>
-                <a:cubicBezTo>
-                  <a:pt x="2141030" y="0"/>
-                  <a:pt x="2141030" y="0"/>
-                  <a:pt x="2141030" y="0"/>
-                </a:cubicBezTo>
-                <a:cubicBezTo>
-                  <a:pt x="2206170" y="0"/>
-                  <a:pt x="2290471" y="45985"/>
-                  <a:pt x="2324957" y="103466"/>
-                </a:cubicBezTo>
-                <a:cubicBezTo>
-                  <a:pt x="2968702" y="1218596"/>
-                  <a:pt x="2968702" y="1218596"/>
-                  <a:pt x="2968702" y="1218596"/>
-                </a:cubicBezTo>
-                <a:cubicBezTo>
-                  <a:pt x="2999357" y="1279909"/>
-                  <a:pt x="2999357" y="1371878"/>
-                  <a:pt x="2968702" y="1433192"/>
-                </a:cubicBezTo>
-                <a:cubicBezTo>
-                  <a:pt x="2324957" y="2548321"/>
-                  <a:pt x="2324957" y="2548321"/>
-                  <a:pt x="2324957" y="2548321"/>
-                </a:cubicBezTo>
-                <a:cubicBezTo>
-                  <a:pt x="2290471" y="2605803"/>
-                  <a:pt x="2206170" y="2651787"/>
-                  <a:pt x="2141030" y="2651787"/>
-                </a:cubicBezTo>
-                <a:lnTo>
-                  <a:pt x="853538" y="2651787"/>
-                </a:lnTo>
-                <a:cubicBezTo>
-                  <a:pt x="784566" y="2651787"/>
-                  <a:pt x="700266" y="2605803"/>
-                  <a:pt x="669612" y="2548321"/>
-                </a:cubicBezTo>
-                <a:cubicBezTo>
-                  <a:pt x="25866" y="1433192"/>
-                  <a:pt x="25866" y="1433192"/>
-                  <a:pt x="25866" y="1433192"/>
-                </a:cubicBezTo>
-                <a:cubicBezTo>
-                  <a:pt x="-8621" y="1371878"/>
-                  <a:pt x="-8621" y="1279909"/>
-                  <a:pt x="25866" y="1218596"/>
-                </a:cubicBezTo>
-                <a:cubicBezTo>
-                  <a:pt x="669612" y="103466"/>
-                  <a:pt x="669612" y="103466"/>
-                  <a:pt x="669612" y="103466"/>
-                </a:cubicBezTo>
-                <a:cubicBezTo>
-                  <a:pt x="700266" y="45985"/>
-                  <a:pt x="784566" y="0"/>
-                  <a:pt x="853538" y="0"/>
-                </a:cubicBezTo>
-                <a:close/>
-              </a:path>
-            </a:pathLst>
-          </a:custGeom>
-          <a:noFill/>
-          <a:ln w="50800" cap="flat">
-            <a:solidFill>
-              <a:schemeClr val="tx1"/>
-            </a:solidFill>
-            <a:prstDash val="solid"/>
-            <a:miter lim="800000"/>
-            <a:headEnd/>
-            <a:tailEnd/>
-          </a:ln>
-        </p:spPr>
-        <p:txBody>
-          <a:bodyPr vert="horz" wrap="square" lIns="91440" tIns="45720" rIns="91440" bIns="45720" numCol="1" anchor="t" anchorCtr="0" compatLnSpc="1">
-            <a:prstTxWarp prst="textNoShape">
-              <a:avLst/>
-            </a:prstTxWarp>
-          </a:bodyPr>
-          <a:lstStyle/>
-          <a:p>
-            <a:pPr marL="0" marR="0" lvl="0" indent="0" algn="l" defTabSz="914400" rtl="0" eaLnBrk="1" fontAlgn="auto" latinLnBrk="0" hangingPunct="1">
-              <a:lnSpc>
-                <a:spcPct val="100000"/>
-              </a:lnSpc>
-              <a:spcBef>
-                <a:spcPts val="0"/>
-              </a:spcBef>
-              <a:spcAft>
-                <a:spcPts val="0"/>
-              </a:spcAft>
-              <a:buClrTx/>
-              <a:buSzTx/>
-              <a:buFontTx/>
-              <a:buNone/>
-              <a:tabLst/>
-              <a:defRPr/>
-            </a:pPr>
-            <a:endParaRPr kumimoji="0" lang="en-US" sz="1800" b="0" i="0" u="none" strike="noStrike" kern="1200" cap="none" spc="0" normalizeH="0" baseline="0" noProof="0" dirty="0">
-              <a:ln>
-                <a:noFill/>
-              </a:ln>
-              <a:solidFill>
-                <a:prstClr val="black"/>
-              </a:solidFill>
-              <a:effectLst/>
-              <a:uLnTx/>
-              <a:uFillTx/>
-              <a:latin typeface="Calibri" panose="020F0502020204030204"/>
-              <a:ea typeface="+mn-ea"/>
-              <a:cs typeface="+mn-cs"/>
-            </a:endParaRPr>
-          </a:p>
-        </p:txBody>
-      </p:sp>
-      <p:sp>
-        <p:nvSpPr>
-          <p:cNvPr id="10" name="Google Shape;55;p13">
-            <a:extLst>
-              <a:ext uri="{FF2B5EF4-FFF2-40B4-BE49-F238E27FC236}">
-                <a16:creationId xmlns:a16="http://schemas.microsoft.com/office/drawing/2014/main" id="{F6E61504-9462-4F2B-BF6D-31CBE01EBD3B}"/>
-              </a:ext>
-            </a:extLst>
-          </p:cNvPr>
-          <p:cNvSpPr txBox="1">
-            <a:spLocks noGrp="1"/>
-          </p:cNvSpPr>
-          <p:nvPr>
-            <p:ph type="subTitle" idx="1"/>
-          </p:nvPr>
-        </p:nvSpPr>
-        <p:spPr>
-          <a:xfrm>
-            <a:off x="2447267" y="5920221"/>
-            <a:ext cx="5924212" cy="794567"/>
-          </a:xfrm>
-          <a:prstGeom prst="rect">
-            <a:avLst/>
-          </a:prstGeom>
-        </p:spPr>
-        <p:txBody>
-          <a:bodyPr spcFirstLastPara="1" wrap="square" lIns="91425" tIns="91425" rIns="91425" bIns="91425" anchor="t" anchorCtr="0">
-            <a:noAutofit/>
-          </a:bodyPr>
-          <a:lstStyle/>
-          <a:p>
-            <a:pPr marL="0" lvl="0" indent="0" algn="ctr" rtl="0">
-              <a:spcBef>
-                <a:spcPts val="0"/>
-              </a:spcBef>
-              <a:spcAft>
-                <a:spcPts val="600"/>
-              </a:spcAft>
-              <a:buNone/>
-            </a:pPr>
-            <a:r>
-              <a:rPr lang="en" sz="2000" dirty="0">
-                <a:latin typeface="Comic Sans MS" panose="030F0702030302020204" pitchFamily="66" charset="0"/>
-              </a:rPr>
-              <a:t>Infrastructure as Code User Group Oslo</a:t>
-            </a:r>
-            <a:endParaRPr lang="en-US" sz="2000" dirty="0">
-              <a:latin typeface="Comic Sans MS" panose="030F0702030302020204" pitchFamily="66" charset="0"/>
-            </a:endParaRPr>
-          </a:p>
-          <a:p>
-            <a:pPr marL="0" lvl="0" indent="0" algn="ctr" rtl="0">
-              <a:spcBef>
-                <a:spcPts val="0"/>
-              </a:spcBef>
-              <a:spcAft>
-                <a:spcPts val="600"/>
-              </a:spcAft>
-              <a:buNone/>
-            </a:pPr>
-            <a:r>
-              <a:rPr lang="en-US" sz="2000" dirty="0">
-                <a:latin typeface="Comic Sans MS" panose="030F0702030302020204" pitchFamily="66" charset="0"/>
-              </a:rPr>
-              <a:t>w</a:t>
-            </a:r>
-            <a:r>
-              <a:rPr lang="en" sz="2000" dirty="0">
-                <a:latin typeface="Comic Sans MS" panose="030F0702030302020204" pitchFamily="66" charset="0"/>
-              </a:rPr>
-              <a:t>ith Evgeny Borzenin</a:t>
-            </a:r>
-            <a:endParaRPr lang="en-US" sz="2000" dirty="0">
-              <a:latin typeface="Comic Sans MS" panose="030F0702030302020204" pitchFamily="66" charset="0"/>
-            </a:endParaRPr>
-          </a:p>
-        </p:txBody>
-      </p:sp>
-      <p:pic>
-        <p:nvPicPr>
-          <p:cNvPr id="12" name="Graphic 4">
-            <a:extLst>
-              <a:ext uri="{FF2B5EF4-FFF2-40B4-BE49-F238E27FC236}">
-                <a16:creationId xmlns:a16="http://schemas.microsoft.com/office/drawing/2014/main" id="{EDCA261C-CB9C-438E-83DA-373119F69A1E}"/>
-              </a:ext>
-            </a:extLst>
-          </p:cNvPr>
-          <p:cNvPicPr>
-            <a:picLocks noChangeAspect="1"/>
-          </p:cNvPicPr>
-          <p:nvPr/>
-        </p:nvPicPr>
-        <p:blipFill>
-          <a:blip r:embed="rId3">
-            <a:extLst>
-              <a:ext uri="{28A0092B-C50C-407E-A947-70E740481C1C}">
-                <a14:useLocalDpi xmlns:a14="http://schemas.microsoft.com/office/drawing/2010/main" val="0"/>
-              </a:ext>
-              <a:ext uri="{96DAC541-7B7A-43D3-8B79-37D633B846F1}">
-                <asvg:svgBlip xmlns:asvg="http://schemas.microsoft.com/office/drawing/2016/SVG/main" r:embed="rId4"/>
-              </a:ext>
-            </a:extLst>
-          </a:blip>
-          <a:stretch>
-            <a:fillRect/>
-          </a:stretch>
-        </p:blipFill>
-        <p:spPr>
-          <a:xfrm>
-            <a:off x="375137" y="6121057"/>
-            <a:ext cx="1718444" cy="574556"/>
-          </a:xfrm>
-          <a:prstGeom prst="rect">
-            <a:avLst/>
-          </a:prstGeom>
-        </p:spPr>
-      </p:pic>
-      <p:pic>
-        <p:nvPicPr>
-          <p:cNvPr id="13" name="Google Shape;56;p13">
-            <a:extLst>
-              <a:ext uri="{FF2B5EF4-FFF2-40B4-BE49-F238E27FC236}">
-                <a16:creationId xmlns:a16="http://schemas.microsoft.com/office/drawing/2014/main" id="{5D6A8592-4B29-429E-A8AC-240C35AA1049}"/>
-              </a:ext>
-            </a:extLst>
-          </p:cNvPr>
-          <p:cNvPicPr preferRelativeResize="0"/>
-          <p:nvPr/>
-        </p:nvPicPr>
-        <p:blipFill>
-          <a:blip r:embed="rId5">
-            <a:alphaModFix/>
-          </a:blip>
-          <a:stretch>
-            <a:fillRect/>
-          </a:stretch>
-        </p:blipFill>
-        <p:spPr>
-          <a:xfrm>
-            <a:off x="10989179" y="5736492"/>
-            <a:ext cx="1202821" cy="1121508"/>
-          </a:xfrm>
-          <a:prstGeom prst="rect">
-            <a:avLst/>
-          </a:prstGeom>
-          <a:noFill/>
-          <a:ln>
-            <a:noFill/>
-          </a:ln>
-        </p:spPr>
-      </p:pic>
-      <p:pic>
-        <p:nvPicPr>
-          <p:cNvPr id="7" name="Graphic 6">
-            <a:extLst>
-              <a:ext uri="{FF2B5EF4-FFF2-40B4-BE49-F238E27FC236}">
-                <a16:creationId xmlns:a16="http://schemas.microsoft.com/office/drawing/2014/main" id="{98AD8761-1DFA-75A4-F789-38D363B6DD76}"/>
-              </a:ext>
-            </a:extLst>
-          </p:cNvPr>
-          <p:cNvPicPr>
-            <a:picLocks noChangeAspect="1"/>
-          </p:cNvPicPr>
-          <p:nvPr/>
-        </p:nvPicPr>
-        <p:blipFill>
-          <a:blip r:embed="rId6">
-            <a:extLst>
-              <a:ext uri="{28A0092B-C50C-407E-A947-70E740481C1C}">
-                <a14:useLocalDpi xmlns:a14="http://schemas.microsoft.com/office/drawing/2010/main" val="0"/>
-              </a:ext>
-              <a:ext uri="{96DAC541-7B7A-43D3-8B79-37D633B846F1}">
-                <asvg:svgBlip xmlns:asvg="http://schemas.microsoft.com/office/drawing/2016/SVG/main" r:embed="rId7"/>
-              </a:ext>
-            </a:extLst>
-          </a:blip>
-          <a:stretch>
-            <a:fillRect/>
-          </a:stretch>
-        </p:blipFill>
-        <p:spPr>
-          <a:xfrm>
-            <a:off x="9350334" y="1973799"/>
-            <a:ext cx="1147552" cy="1147552"/>
-          </a:xfrm>
-          <a:prstGeom prst="rect">
-            <a:avLst/>
-          </a:prstGeom>
-        </p:spPr>
-      </p:pic>
-      <p:pic>
-        <p:nvPicPr>
-          <p:cNvPr id="11" name="Graphic 10">
-            <a:extLst>
-              <a:ext uri="{FF2B5EF4-FFF2-40B4-BE49-F238E27FC236}">
-                <a16:creationId xmlns:a16="http://schemas.microsoft.com/office/drawing/2014/main" id="{3E27198C-DC99-922B-A066-6F7D8171A9C5}"/>
-              </a:ext>
-            </a:extLst>
-          </p:cNvPr>
-          <p:cNvPicPr>
-            <a:picLocks noChangeAspect="1"/>
-          </p:cNvPicPr>
-          <p:nvPr/>
-        </p:nvPicPr>
-        <p:blipFill>
-          <a:blip r:embed="rId8">
-            <a:extLst>
-              <a:ext uri="{28A0092B-C50C-407E-A947-70E740481C1C}">
-                <a14:useLocalDpi xmlns:a14="http://schemas.microsoft.com/office/drawing/2010/main" val="0"/>
-              </a:ext>
-              <a:ext uri="{96DAC541-7B7A-43D3-8B79-37D633B846F1}">
-                <asvg:svgBlip xmlns:asvg="http://schemas.microsoft.com/office/drawing/2016/SVG/main" r:embed="rId9"/>
-              </a:ext>
-            </a:extLst>
-          </a:blip>
-          <a:stretch>
-            <a:fillRect/>
-          </a:stretch>
-        </p:blipFill>
-        <p:spPr>
-          <a:xfrm>
-            <a:off x="7826947" y="3137381"/>
-            <a:ext cx="1147552" cy="1147552"/>
-          </a:xfrm>
-          <a:prstGeom prst="rect">
-            <a:avLst/>
-          </a:prstGeom>
-        </p:spPr>
-      </p:pic>
-      <p:pic>
-        <p:nvPicPr>
-          <p:cNvPr id="15" name="Graphic 14">
-            <a:extLst>
-              <a:ext uri="{FF2B5EF4-FFF2-40B4-BE49-F238E27FC236}">
-                <a16:creationId xmlns:a16="http://schemas.microsoft.com/office/drawing/2014/main" id="{95250E79-B463-F794-B27F-C843497064C0}"/>
-              </a:ext>
-            </a:extLst>
-          </p:cNvPr>
-          <p:cNvPicPr>
-            <a:picLocks noChangeAspect="1"/>
-          </p:cNvPicPr>
-          <p:nvPr/>
-        </p:nvPicPr>
-        <p:blipFill>
-          <a:blip r:embed="rId10">
-            <a:extLst>
-              <a:ext uri="{28A0092B-C50C-407E-A947-70E740481C1C}">
-                <a14:useLocalDpi xmlns:a14="http://schemas.microsoft.com/office/drawing/2010/main" val="0"/>
-              </a:ext>
-              <a:ext uri="{96DAC541-7B7A-43D3-8B79-37D633B846F1}">
-                <asvg:svgBlip xmlns:asvg="http://schemas.microsoft.com/office/drawing/2016/SVG/main" r:embed="rId11"/>
-              </a:ext>
-            </a:extLst>
-          </a:blip>
-          <a:stretch>
-            <a:fillRect/>
-          </a:stretch>
-        </p:blipFill>
-        <p:spPr>
-          <a:xfrm>
-            <a:off x="9677688" y="4071354"/>
-            <a:ext cx="1032550" cy="1032550"/>
-          </a:xfrm>
-          <a:prstGeom prst="rect">
-            <a:avLst/>
-          </a:prstGeom>
-        </p:spPr>
-      </p:pic>
-      <p:pic>
-        <p:nvPicPr>
-          <p:cNvPr id="16" name="Picture 4" descr="AzureFunBytes - Getting started with Bicep - Azure DevOps Blog">
-            <a:extLst>
-              <a:ext uri="{FF2B5EF4-FFF2-40B4-BE49-F238E27FC236}">
-                <a16:creationId xmlns:a16="http://schemas.microsoft.com/office/drawing/2014/main" id="{DA60C3A7-B664-BE89-61AE-CEA3AF047E71}"/>
-              </a:ext>
-            </a:extLst>
-          </p:cNvPr>
-          <p:cNvPicPr>
-            <a:picLocks noChangeAspect="1" noChangeArrowheads="1"/>
-          </p:cNvPicPr>
-          <p:nvPr/>
-        </p:nvPicPr>
-        <p:blipFill>
-          <a:blip r:embed="rId12">
-            <a:extLst>
-              <a:ext uri="{28A0092B-C50C-407E-A947-70E740481C1C}">
-                <a14:useLocalDpi xmlns:a14="http://schemas.microsoft.com/office/drawing/2010/main" val="0"/>
-              </a:ext>
-            </a:extLst>
-          </a:blip>
-          <a:srcRect/>
-          <a:stretch>
-            <a:fillRect/>
-          </a:stretch>
-        </p:blipFill>
-        <p:spPr bwMode="auto">
-          <a:xfrm>
-            <a:off x="5409373" y="1262973"/>
-            <a:ext cx="1421652" cy="1421652"/>
-          </a:xfrm>
-          <a:prstGeom prst="rect">
-            <a:avLst/>
-          </a:prstGeom>
-          <a:noFill/>
-          <a:extLst>
-            <a:ext uri="{909E8E84-426E-40DD-AFC4-6F175D3DCCD1}">
-              <a14:hiddenFill xmlns:a14="http://schemas.microsoft.com/office/drawing/2010/main">
-                <a:solidFill>
-                  <a:srgbClr val="FFFFFF"/>
-                </a:solidFill>
-              </a14:hiddenFill>
-            </a:ext>
-          </a:extLst>
-        </p:spPr>
-      </p:pic>
-    </p:spTree>
-    <p:extLst>
-      <p:ext uri="{BB962C8B-B14F-4D97-AF65-F5344CB8AC3E}">
-        <p14:creationId xmlns:p14="http://schemas.microsoft.com/office/powerpoint/2010/main" val="815234218"/>
-      </p:ext>
-    </p:extLst>
-  </p:cSld>
-  <p:clrMapOvr>
-    <a:masterClrMapping/>
-  </p:clrMapOvr>
-</p:sld>
-</file>
-
-<file path=ppt/slides/slide3.xml><?xml version="1.0" encoding="utf-8"?>
-<p:sld xmlns:a="http://schemas.openxmlformats.org/drawingml/2006/main" xmlns:r="http://schemas.openxmlformats.org/officeDocument/2006/relationships" xmlns:p="http://schemas.openxmlformats.org/presentationml/2006/main">
-  <p:cSld>
-    <p:spTree>
-      <p:nvGrpSpPr>
-        <p:cNvPr id="1" name=""/>
-        <p:cNvGrpSpPr/>
-        <p:nvPr/>
-      </p:nvGrpSpPr>
-      <p:grpSpPr>
-        <a:xfrm>
-          <a:off x="0" y="0"/>
-          <a:ext cx="0" cy="0"/>
-          <a:chOff x="0" y="0"/>
-          <a:chExt cx="0" cy="0"/>
-        </a:xfrm>
-      </p:grpSpPr>
       <p:sp>
         <p:nvSpPr>
           <p:cNvPr id="2" name="Title 1">
@@ -7634,8 +6073,14 @@
           </a:p>
           <a:p>
             <a:r>
-              <a:rPr lang="en-US" dirty="0"/>
+              <a:rPr lang="en-US" strike="sngStrike" dirty="0"/>
               <a:t>[  ] Working with Azure Container Apps</a:t>
+            </a:r>
+          </a:p>
+          <a:p>
+            <a:r>
+              <a:rPr lang="en-US" b="1" dirty="0"/>
+              <a:t>[  ] Working with Azure Private Links</a:t>
             </a:r>
           </a:p>
           <a:p>
@@ -7646,14 +6091,12 @@
           </a:p>
           <a:p>
             <a:r>
+              <a:rPr lang="en-US"/>
+              <a:t>[  </a:t>
+            </a:r>
+            <a:r>
               <a:rPr lang="en-US" dirty="0"/>
-              <a:t>[  ] Azure API Management 101</a:t>
-            </a:r>
-          </a:p>
-          <a:p>
-            <a:r>
-              <a:rPr lang="en-US" dirty="0"/>
-              <a:t>[  ] Security in AKS</a:t>
+              <a:t>] Security in AKS</a:t>
             </a:r>
           </a:p>
           <a:p>
@@ -7763,7 +6206,7 @@
 </p:sld>
 </file>
 
-<file path=ppt/slides/slide4.xml><?xml version="1.0" encoding="utf-8"?>
+<file path=ppt/slides/slide3.xml><?xml version="1.0" encoding="utf-8"?>
 <p:sld xmlns:a="http://schemas.openxmlformats.org/drawingml/2006/main" xmlns:r="http://schemas.openxmlformats.org/officeDocument/2006/relationships" xmlns:p="http://schemas.openxmlformats.org/presentationml/2006/main">
   <p:cSld>
     <p:spTree>
@@ -7996,7 +6439,7 @@
 </p:sld>
 </file>
 
-<file path=ppt/slides/slide5.xml><?xml version="1.0" encoding="utf-8"?>
+<file path=ppt/slides/slide4.xml><?xml version="1.0" encoding="utf-8"?>
 <p:sld xmlns:a="http://schemas.openxmlformats.org/drawingml/2006/main" xmlns:r="http://schemas.openxmlformats.org/officeDocument/2006/relationships" xmlns:p="http://schemas.openxmlformats.org/presentationml/2006/main">
   <p:cSld>
     <p:spTree>
@@ -8319,7 +6762,7 @@
 </p:sld>
 </file>
 
-<file path=ppt/slides/slide6.xml><?xml version="1.0" encoding="utf-8"?>
+<file path=ppt/slides/slide5.xml><?xml version="1.0" encoding="utf-8"?>
 <p:sld xmlns:a="http://schemas.openxmlformats.org/drawingml/2006/main" xmlns:r="http://schemas.openxmlformats.org/officeDocument/2006/relationships" xmlns:p="http://schemas.openxmlformats.org/presentationml/2006/main">
   <p:cSld>
     <p:spTree>
@@ -8575,7 +7018,7 @@
 </p:sld>
 </file>
 
-<file path=ppt/slides/slide7.xml><?xml version="1.0" encoding="utf-8"?>
+<file path=ppt/slides/slide6.xml><?xml version="1.0" encoding="utf-8"?>
 <p:sld xmlns:a="http://schemas.openxmlformats.org/drawingml/2006/main" xmlns:r="http://schemas.openxmlformats.org/officeDocument/2006/relationships" xmlns:p="http://schemas.openxmlformats.org/presentationml/2006/main">
   <p:cSld>
     <p:spTree>

</xml_diff>

<commit_message>
lab05 - links + slides
</commit_message>
<xml_diff>
--- a/slides/private-links.pptx
+++ b/slides/private-links.pptx
@@ -5,7 +5,7 @@
     <p:sldMasterId id="2147483660" r:id="rId1"/>
   </p:sldMasterIdLst>
   <p:notesMasterIdLst>
-    <p:notesMasterId r:id="rId29"/>
+    <p:notesMasterId r:id="rId33"/>
   </p:notesMasterIdLst>
   <p:sldIdLst>
     <p:sldId id="2076136299" r:id="rId2"/>
@@ -33,8 +33,12 @@
     <p:sldId id="2076136342" r:id="rId24"/>
     <p:sldId id="2076136345" r:id="rId25"/>
     <p:sldId id="2076136344" r:id="rId26"/>
-    <p:sldId id="2076136347" r:id="rId27"/>
-    <p:sldId id="2076136302" r:id="rId28"/>
+    <p:sldId id="2076136348" r:id="rId27"/>
+    <p:sldId id="2076136349" r:id="rId28"/>
+    <p:sldId id="2076136350" r:id="rId29"/>
+    <p:sldId id="2076136351" r:id="rId30"/>
+    <p:sldId id="2076136347" r:id="rId31"/>
+    <p:sldId id="2076136302" r:id="rId32"/>
   </p:sldIdLst>
   <p:sldSz cx="12192000" cy="6858000"/>
   <p:notesSz cx="6858000" cy="9144000"/>
@@ -1596,6 +1600,120 @@
           <a:bodyPr/>
           <a:lstStyle/>
           <a:p>
+            <a:pPr marL="0" marR="0" lvl="0" indent="0" algn="l" defTabSz="914400" rtl="0" eaLnBrk="1" fontAlgn="auto" latinLnBrk="0" hangingPunct="1">
+              <a:lnSpc>
+                <a:spcPct val="100000"/>
+              </a:lnSpc>
+              <a:spcBef>
+                <a:spcPts val="0"/>
+              </a:spcBef>
+              <a:spcAft>
+                <a:spcPts val="0"/>
+              </a:spcAft>
+              <a:buClrTx/>
+              <a:buSzTx/>
+              <a:buFontTx/>
+              <a:buNone/>
+              <a:tabLst/>
+              <a:defRPr/>
+            </a:pPr>
+            <a:r>
+              <a:rPr lang="en-US" b="0" i="0" dirty="0">
+                <a:solidFill>
+                  <a:srgbClr val="161616"/>
+                </a:solidFill>
+                <a:effectLst/>
+                <a:latin typeface="Segoe UI" panose="020B0502040204020203" pitchFamily="34" charset="0"/>
+              </a:rPr>
+              <a:t>Azure Policy evaluates resources and actions in Azure by comparing the properties of those resources to business rules.</a:t>
+            </a:r>
+            <a:endParaRPr lang="nb-NO" dirty="0"/>
+          </a:p>
+          <a:p>
+            <a:endParaRPr lang="en-US" dirty="0"/>
+          </a:p>
+        </p:txBody>
+      </p:sp>
+      <p:sp>
+        <p:nvSpPr>
+          <p:cNvPr id="4" name="Slide Number Placeholder 3"/>
+          <p:cNvSpPr>
+            <a:spLocks noGrp="1"/>
+          </p:cNvSpPr>
+          <p:nvPr>
+            <p:ph type="sldNum" sz="quarter" idx="5"/>
+          </p:nvPr>
+        </p:nvSpPr>
+        <p:spPr/>
+        <p:txBody>
+          <a:bodyPr/>
+          <a:lstStyle/>
+          <a:p>
+            <a:fld id="{FB3A52E1-8A48-429C-8A5A-7D4445DBC12D}" type="slidenum">
+              <a:rPr lang="nb-NO" smtClean="0"/>
+              <a:t>28</a:t>
+            </a:fld>
+            <a:endParaRPr lang="nb-NO"/>
+          </a:p>
+        </p:txBody>
+      </p:sp>
+    </p:spTree>
+    <p:extLst>
+      <p:ext uri="{BB962C8B-B14F-4D97-AF65-F5344CB8AC3E}">
+        <p14:creationId xmlns:p14="http://schemas.microsoft.com/office/powerpoint/2010/main" val="3577364540"/>
+      </p:ext>
+    </p:extLst>
+  </p:cSld>
+  <p:clrMapOvr>
+    <a:masterClrMapping/>
+  </p:clrMapOvr>
+</p:notes>
+</file>
+
+<file path=ppt/notesSlides/notesSlide16.xml><?xml version="1.0" encoding="utf-8"?>
+<p:notes xmlns:a="http://schemas.openxmlformats.org/drawingml/2006/main" xmlns:r="http://schemas.openxmlformats.org/officeDocument/2006/relationships" xmlns:p="http://schemas.openxmlformats.org/presentationml/2006/main">
+  <p:cSld>
+    <p:spTree>
+      <p:nvGrpSpPr>
+        <p:cNvPr id="1" name=""/>
+        <p:cNvGrpSpPr/>
+        <p:nvPr/>
+      </p:nvGrpSpPr>
+      <p:grpSpPr>
+        <a:xfrm>
+          <a:off x="0" y="0"/>
+          <a:ext cx="0" cy="0"/>
+          <a:chOff x="0" y="0"/>
+          <a:chExt cx="0" cy="0"/>
+        </a:xfrm>
+      </p:grpSpPr>
+      <p:sp>
+        <p:nvSpPr>
+          <p:cNvPr id="2" name="Slide Image Placeholder 1"/>
+          <p:cNvSpPr>
+            <a:spLocks noGrp="1" noRot="1" noChangeAspect="1"/>
+          </p:cNvSpPr>
+          <p:nvPr>
+            <p:ph type="sldImg"/>
+          </p:nvPr>
+        </p:nvSpPr>
+        <p:spPr/>
+      </p:sp>
+      <p:sp>
+        <p:nvSpPr>
+          <p:cNvPr id="3" name="Notes Placeholder 2"/>
+          <p:cNvSpPr>
+            <a:spLocks noGrp="1"/>
+          </p:cNvSpPr>
+          <p:nvPr>
+            <p:ph type="body" idx="1"/>
+          </p:nvPr>
+        </p:nvSpPr>
+        <p:spPr/>
+        <p:txBody>
+          <a:bodyPr/>
+          <a:lstStyle/>
+          <a:p>
             <a:endParaRPr lang="nb-NO" dirty="0"/>
           </a:p>
         </p:txBody>
@@ -1664,7 +1782,7 @@
                 <a:tabLst/>
                 <a:defRPr/>
               </a:pPr>
-              <a:t>27</a:t>
+              <a:t>31</a:t>
             </a:fld>
             <a:endParaRPr kumimoji="0" lang="en-US" sz="1200" b="0" i="0" u="none" strike="noStrike" kern="1200" cap="none" spc="0" normalizeH="0" baseline="0" noProof="0">
               <a:ln>
@@ -10862,19 +10980,24 @@
           <a:p>
             <a:r>
               <a:rPr lang="en-US" b="1" dirty="0"/>
-              <a:t>[  ] Working with Azure Private Links</a:t>
+              <a:t>[  ] Working with Azure Private Links (June)</a:t>
             </a:r>
           </a:p>
           <a:p>
             <a:r>
               <a:rPr lang="en-US" dirty="0"/>
-              <a:t>[  ] Azure Landing Zones 101 (August)</a:t>
-            </a:r>
+              <a:t>[  ] Working with Azure Policy </a:t>
+            </a:r>
+            <a:r>
+              <a:rPr lang="en-US"/>
+              <a:t>(August)</a:t>
+            </a:r>
+            <a:endParaRPr lang="en-US" dirty="0"/>
           </a:p>
           <a:p>
             <a:r>
               <a:rPr lang="en-US" dirty="0"/>
-              <a:t>[  ] Security in AKS</a:t>
+              <a:t>[  ] Azure Landing Zones 101 (September)</a:t>
             </a:r>
           </a:p>
           <a:p>
@@ -11362,6 +11485,79 @@
           </a:p>
         </p:txBody>
       </p:sp>
+      <p:pic>
+        <p:nvPicPr>
+          <p:cNvPr id="3" name="Google Shape;56;p13">
+            <a:extLst>
+              <a:ext uri="{FF2B5EF4-FFF2-40B4-BE49-F238E27FC236}">
+                <a16:creationId xmlns:a16="http://schemas.microsoft.com/office/drawing/2014/main" id="{833766AA-73C5-CC3A-7C6E-7424B820A916}"/>
+              </a:ext>
+            </a:extLst>
+          </p:cNvPr>
+          <p:cNvPicPr preferRelativeResize="0"/>
+          <p:nvPr/>
+        </p:nvPicPr>
+        <p:blipFill>
+          <a:blip r:embed="rId5">
+            <a:alphaModFix/>
+          </a:blip>
+          <a:stretch>
+            <a:fillRect/>
+          </a:stretch>
+        </p:blipFill>
+        <p:spPr>
+          <a:xfrm>
+            <a:off x="10989179" y="5736492"/>
+            <a:ext cx="1202821" cy="1121508"/>
+          </a:xfrm>
+          <a:prstGeom prst="rect">
+            <a:avLst/>
+          </a:prstGeom>
+          <a:noFill/>
+          <a:ln>
+            <a:noFill/>
+          </a:ln>
+        </p:spPr>
+      </p:pic>
+      <p:pic>
+        <p:nvPicPr>
+          <p:cNvPr id="4" name="Graphic 3">
+            <a:extLst>
+              <a:ext uri="{FF2B5EF4-FFF2-40B4-BE49-F238E27FC236}">
+                <a16:creationId xmlns:a16="http://schemas.microsoft.com/office/drawing/2014/main" id="{2EB83ACD-1A15-1E9D-FA26-E970C8232213}"/>
+              </a:ext>
+            </a:extLst>
+          </p:cNvPr>
+          <p:cNvPicPr>
+            <a:picLocks noChangeAspect="1"/>
+          </p:cNvPicPr>
+          <p:nvPr/>
+        </p:nvPicPr>
+        <p:blipFill>
+          <a:blip r:embed="rId6">
+            <a:extLst>
+              <a:ext uri="{28A0092B-C50C-407E-A947-70E740481C1C}">
+                <a14:useLocalDpi xmlns:a14="http://schemas.microsoft.com/office/drawing/2010/main" val="0"/>
+              </a:ext>
+              <a:ext uri="{96DAC541-7B7A-43D3-8B79-37D633B846F1}">
+                <asvg:svgBlip xmlns:asvg="http://schemas.microsoft.com/office/drawing/2016/SVG/main" r:embed="rId7"/>
+              </a:ext>
+            </a:extLst>
+          </a:blip>
+          <a:stretch>
+            <a:fillRect/>
+          </a:stretch>
+        </p:blipFill>
+        <p:spPr>
+          <a:xfrm>
+            <a:off x="375137" y="6121057"/>
+            <a:ext cx="1718444" cy="574556"/>
+          </a:xfrm>
+          <a:prstGeom prst="rect">
+            <a:avLst/>
+          </a:prstGeom>
+        </p:spPr>
+      </p:pic>
     </p:spTree>
     <p:extLst>
       <p:ext uri="{BB962C8B-B14F-4D97-AF65-F5344CB8AC3E}">
@@ -13487,6 +13683,79 @@
           </a:p>
         </p:txBody>
       </p:sp>
+      <p:pic>
+        <p:nvPicPr>
+          <p:cNvPr id="3" name="Google Shape;56;p13">
+            <a:extLst>
+              <a:ext uri="{FF2B5EF4-FFF2-40B4-BE49-F238E27FC236}">
+                <a16:creationId xmlns:a16="http://schemas.microsoft.com/office/drawing/2014/main" id="{CD3774D5-F270-0889-F17C-DB02AE6FECB6}"/>
+              </a:ext>
+            </a:extLst>
+          </p:cNvPr>
+          <p:cNvPicPr preferRelativeResize="0"/>
+          <p:nvPr/>
+        </p:nvPicPr>
+        <p:blipFill>
+          <a:blip r:embed="rId5">
+            <a:alphaModFix/>
+          </a:blip>
+          <a:stretch>
+            <a:fillRect/>
+          </a:stretch>
+        </p:blipFill>
+        <p:spPr>
+          <a:xfrm>
+            <a:off x="10989179" y="5736492"/>
+            <a:ext cx="1202821" cy="1121508"/>
+          </a:xfrm>
+          <a:prstGeom prst="rect">
+            <a:avLst/>
+          </a:prstGeom>
+          <a:noFill/>
+          <a:ln>
+            <a:noFill/>
+          </a:ln>
+        </p:spPr>
+      </p:pic>
+      <p:pic>
+        <p:nvPicPr>
+          <p:cNvPr id="4" name="Graphic 3">
+            <a:extLst>
+              <a:ext uri="{FF2B5EF4-FFF2-40B4-BE49-F238E27FC236}">
+                <a16:creationId xmlns:a16="http://schemas.microsoft.com/office/drawing/2014/main" id="{DD7B855C-2AE7-F486-9985-CE74EC4A83C3}"/>
+              </a:ext>
+            </a:extLst>
+          </p:cNvPr>
+          <p:cNvPicPr>
+            <a:picLocks noChangeAspect="1"/>
+          </p:cNvPicPr>
+          <p:nvPr/>
+        </p:nvPicPr>
+        <p:blipFill>
+          <a:blip r:embed="rId6">
+            <a:extLst>
+              <a:ext uri="{28A0092B-C50C-407E-A947-70E740481C1C}">
+                <a14:useLocalDpi xmlns:a14="http://schemas.microsoft.com/office/drawing/2010/main" val="0"/>
+              </a:ext>
+              <a:ext uri="{96DAC541-7B7A-43D3-8B79-37D633B846F1}">
+                <asvg:svgBlip xmlns:asvg="http://schemas.microsoft.com/office/drawing/2016/SVG/main" r:embed="rId7"/>
+              </a:ext>
+            </a:extLst>
+          </a:blip>
+          <a:stretch>
+            <a:fillRect/>
+          </a:stretch>
+        </p:blipFill>
+        <p:spPr>
+          <a:xfrm>
+            <a:off x="375137" y="6121057"/>
+            <a:ext cx="1718444" cy="574556"/>
+          </a:xfrm>
+          <a:prstGeom prst="rect">
+            <a:avLst/>
+          </a:prstGeom>
+        </p:spPr>
+      </p:pic>
     </p:spTree>
     <p:extLst>
       <p:ext uri="{BB962C8B-B14F-4D97-AF65-F5344CB8AC3E}">
@@ -13522,7 +13791,7 @@
           <p:cNvPr id="2" name="Title 1">
             <a:extLst>
               <a:ext uri="{FF2B5EF4-FFF2-40B4-BE49-F238E27FC236}">
-                <a16:creationId xmlns:a16="http://schemas.microsoft.com/office/drawing/2014/main" id="{E35F925F-7C4B-9A04-FAEC-3268DD70660D}"/>
+                <a16:creationId xmlns:a16="http://schemas.microsoft.com/office/drawing/2014/main" id="{0EBC4857-8A2C-7F63-6524-6D81421671D9}"/>
               </a:ext>
             </a:extLst>
           </p:cNvPr>
@@ -13540,7 +13809,56 @@
           <a:p>
             <a:r>
               <a:rPr lang="nb-NO" dirty="0"/>
-              <a:t>Labs</a:t>
+              <a:t>NSG support for Private Endpoint</a:t>
+            </a:r>
+            <a:endParaRPr lang="en-US" dirty="0"/>
+          </a:p>
+        </p:txBody>
+      </p:sp>
+      <p:sp>
+        <p:nvSpPr>
+          <p:cNvPr id="3" name="Text Placeholder 2">
+            <a:extLst>
+              <a:ext uri="{FF2B5EF4-FFF2-40B4-BE49-F238E27FC236}">
+                <a16:creationId xmlns:a16="http://schemas.microsoft.com/office/drawing/2014/main" id="{6E55AA66-CF8A-CA1B-11D9-975B20340B65}"/>
+              </a:ext>
+            </a:extLst>
+          </p:cNvPr>
+          <p:cNvSpPr>
+            <a:spLocks noGrp="1"/>
+          </p:cNvSpPr>
+          <p:nvPr>
+            <p:ph type="body" idx="1"/>
+          </p:nvPr>
+        </p:nvSpPr>
+        <p:spPr/>
+        <p:txBody>
+          <a:bodyPr/>
+          <a:lstStyle/>
+          <a:p>
+            <a:r>
+              <a:rPr lang="nb-NO" dirty="0"/>
+              <a:t>Enable </a:t>
+            </a:r>
+            <a:r>
+              <a:rPr lang="nb-NO" b="1" dirty="0"/>
+              <a:t>PrivateEndpointNetworkPolicies</a:t>
+            </a:r>
+            <a:r>
+              <a:rPr lang="nb-NO" dirty="0"/>
+              <a:t> at the subnet </a:t>
+            </a:r>
+          </a:p>
+          <a:p>
+            <a:r>
+              <a:rPr lang="nb-NO" dirty="0"/>
+              <a:t>Doesn’t support NSG flow logs </a:t>
+            </a:r>
+            <a:r>
+              <a:rPr lang="nb-NO" dirty="0">
+                <a:sym typeface="Wingdings" panose="05000000000000000000" pitchFamily="2" charset="2"/>
+              </a:rPr>
+              <a:t> </a:t>
             </a:r>
             <a:endParaRPr lang="en-US" dirty="0"/>
           </a:p>
@@ -13551,7 +13869,7 @@
           <p:cNvPr id="5" name="Picture 4">
             <a:extLst>
               <a:ext uri="{FF2B5EF4-FFF2-40B4-BE49-F238E27FC236}">
-                <a16:creationId xmlns:a16="http://schemas.microsoft.com/office/drawing/2014/main" id="{AFD38941-BF4D-9F3F-7965-86DADBD63EFA}"/>
+                <a16:creationId xmlns:a16="http://schemas.microsoft.com/office/drawing/2014/main" id="{10EFF769-6BE4-7629-734B-FD0551E95D6B}"/>
               </a:ext>
             </a:extLst>
           </p:cNvPr>
@@ -13568,8 +13886,81 @@
         </p:blipFill>
         <p:spPr>
           <a:xfrm>
-            <a:off x="0" y="1555400"/>
-            <a:ext cx="11991416" cy="4461578"/>
+            <a:off x="1959108" y="2535316"/>
+            <a:ext cx="7942857" cy="533333"/>
+          </a:xfrm>
+          <a:prstGeom prst="rect">
+            <a:avLst/>
+          </a:prstGeom>
+        </p:spPr>
+      </p:pic>
+      <p:pic>
+        <p:nvPicPr>
+          <p:cNvPr id="6" name="Google Shape;56;p13">
+            <a:extLst>
+              <a:ext uri="{FF2B5EF4-FFF2-40B4-BE49-F238E27FC236}">
+                <a16:creationId xmlns:a16="http://schemas.microsoft.com/office/drawing/2014/main" id="{01F05D2D-5FA4-EA4A-4BBF-846391A3500F}"/>
+              </a:ext>
+            </a:extLst>
+          </p:cNvPr>
+          <p:cNvPicPr preferRelativeResize="0"/>
+          <p:nvPr/>
+        </p:nvPicPr>
+        <p:blipFill>
+          <a:blip r:embed="rId3">
+            <a:alphaModFix/>
+          </a:blip>
+          <a:stretch>
+            <a:fillRect/>
+          </a:stretch>
+        </p:blipFill>
+        <p:spPr>
+          <a:xfrm>
+            <a:off x="10989179" y="5736492"/>
+            <a:ext cx="1202821" cy="1121508"/>
+          </a:xfrm>
+          <a:prstGeom prst="rect">
+            <a:avLst/>
+          </a:prstGeom>
+          <a:noFill/>
+          <a:ln>
+            <a:noFill/>
+          </a:ln>
+        </p:spPr>
+      </p:pic>
+      <p:pic>
+        <p:nvPicPr>
+          <p:cNvPr id="7" name="Graphic 6">
+            <a:extLst>
+              <a:ext uri="{FF2B5EF4-FFF2-40B4-BE49-F238E27FC236}">
+                <a16:creationId xmlns:a16="http://schemas.microsoft.com/office/drawing/2014/main" id="{742837ED-4AE5-3911-2B34-71A06AA93A1C}"/>
+              </a:ext>
+            </a:extLst>
+          </p:cNvPr>
+          <p:cNvPicPr>
+            <a:picLocks noChangeAspect="1"/>
+          </p:cNvPicPr>
+          <p:nvPr/>
+        </p:nvPicPr>
+        <p:blipFill>
+          <a:blip r:embed="rId4">
+            <a:extLst>
+              <a:ext uri="{28A0092B-C50C-407E-A947-70E740481C1C}">
+                <a14:useLocalDpi xmlns:a14="http://schemas.microsoft.com/office/drawing/2010/main" val="0"/>
+              </a:ext>
+              <a:ext uri="{96DAC541-7B7A-43D3-8B79-37D633B846F1}">
+                <asvg:svgBlip xmlns:asvg="http://schemas.microsoft.com/office/drawing/2016/SVG/main" r:embed="rId5"/>
+              </a:ext>
+            </a:extLst>
+          </a:blip>
+          <a:stretch>
+            <a:fillRect/>
+          </a:stretch>
+        </p:blipFill>
+        <p:spPr>
+          <a:xfrm>
+            <a:off x="375137" y="6121057"/>
+            <a:ext cx="1718444" cy="574556"/>
           </a:xfrm>
           <a:prstGeom prst="rect">
             <a:avLst/>
@@ -13579,7 +13970,7 @@
     </p:spTree>
     <p:extLst>
       <p:ext uri="{BB962C8B-B14F-4D97-AF65-F5344CB8AC3E}">
-        <p14:creationId xmlns:p14="http://schemas.microsoft.com/office/powerpoint/2010/main" val="1758931061"/>
+        <p14:creationId xmlns:p14="http://schemas.microsoft.com/office/powerpoint/2010/main" val="1796182712"/>
       </p:ext>
     </p:extLst>
   </p:cSld>
@@ -13606,12 +13997,642 @@
           <a:chExt cx="0" cy="0"/>
         </a:xfrm>
       </p:grpSpPr>
+      <p:sp>
+        <p:nvSpPr>
+          <p:cNvPr id="2" name="Title 1">
+            <a:extLst>
+              <a:ext uri="{FF2B5EF4-FFF2-40B4-BE49-F238E27FC236}">
+                <a16:creationId xmlns:a16="http://schemas.microsoft.com/office/drawing/2014/main" id="{67D943B2-6B76-7EA1-BA2A-62C60E4A051C}"/>
+              </a:ext>
+            </a:extLst>
+          </p:cNvPr>
+          <p:cNvSpPr>
+            <a:spLocks noGrp="1"/>
+          </p:cNvSpPr>
+          <p:nvPr>
+            <p:ph type="title"/>
+          </p:nvPr>
+        </p:nvSpPr>
+        <p:spPr/>
+        <p:txBody>
+          <a:bodyPr/>
+          <a:lstStyle/>
+          <a:p>
+            <a:r>
+              <a:rPr lang="en-US" dirty="0"/>
+              <a:t>Private Endpoints in Azure Landing Zone</a:t>
+            </a:r>
+          </a:p>
+        </p:txBody>
+      </p:sp>
       <p:pic>
         <p:nvPicPr>
-          <p:cNvPr id="3" name="Picture 2">
-            <a:extLst>
-              <a:ext uri="{FF2B5EF4-FFF2-40B4-BE49-F238E27FC236}">
-                <a16:creationId xmlns:a16="http://schemas.microsoft.com/office/drawing/2014/main" id="{CFAD4C39-42D6-45D1-9E0D-E17B5050B154}"/>
+          <p:cNvPr id="5" name="Picture 4">
+            <a:extLst>
+              <a:ext uri="{FF2B5EF4-FFF2-40B4-BE49-F238E27FC236}">
+                <a16:creationId xmlns:a16="http://schemas.microsoft.com/office/drawing/2014/main" id="{CCDDA3B0-61D8-86A9-7481-E9370645CED1}"/>
+              </a:ext>
+            </a:extLst>
+          </p:cNvPr>
+          <p:cNvPicPr>
+            <a:picLocks noChangeAspect="1"/>
+          </p:cNvPicPr>
+          <p:nvPr/>
+        </p:nvPicPr>
+        <p:blipFill>
+          <a:blip r:embed="rId2"/>
+          <a:stretch>
+            <a:fillRect/>
+          </a:stretch>
+        </p:blipFill>
+        <p:spPr>
+          <a:xfrm>
+            <a:off x="4156196" y="1841566"/>
+            <a:ext cx="8035804" cy="5016434"/>
+          </a:xfrm>
+          <a:prstGeom prst="rect">
+            <a:avLst/>
+          </a:prstGeom>
+        </p:spPr>
+      </p:pic>
+      <p:sp>
+        <p:nvSpPr>
+          <p:cNvPr id="6" name="Text Placeholder 2">
+            <a:extLst>
+              <a:ext uri="{FF2B5EF4-FFF2-40B4-BE49-F238E27FC236}">
+                <a16:creationId xmlns:a16="http://schemas.microsoft.com/office/drawing/2014/main" id="{95687C93-9A93-93EE-36B2-77B7D6FF4A6A}"/>
+              </a:ext>
+            </a:extLst>
+          </p:cNvPr>
+          <p:cNvSpPr>
+            <a:spLocks noGrp="1"/>
+          </p:cNvSpPr>
+          <p:nvPr>
+            <p:ph type="body" idx="1"/>
+          </p:nvPr>
+        </p:nvSpPr>
+        <p:spPr>
+          <a:xfrm>
+            <a:off x="415600" y="1536633"/>
+            <a:ext cx="5323349" cy="4555200"/>
+          </a:xfrm>
+        </p:spPr>
+        <p:txBody>
+          <a:bodyPr/>
+          <a:lstStyle/>
+          <a:p>
+            <a:r>
+              <a:rPr lang="en-US" dirty="0"/>
+              <a:t>Private Zones at Connectivity LZ</a:t>
+            </a:r>
+          </a:p>
+          <a:p>
+            <a:r>
+              <a:rPr lang="en-US" dirty="0"/>
+              <a:t>Private Endpoint at</a:t>
+            </a:r>
+            <a:br>
+              <a:rPr lang="en-US" dirty="0"/>
+            </a:br>
+            <a:r>
+              <a:rPr lang="en-US" dirty="0"/>
+              <a:t>Workload LZ</a:t>
+            </a:r>
+          </a:p>
+          <a:p>
+            <a:r>
+              <a:rPr lang="en-US" dirty="0"/>
+              <a:t>Workload SPN </a:t>
+            </a:r>
+            <a:br>
+              <a:rPr lang="en-US" dirty="0"/>
+            </a:br>
+            <a:r>
+              <a:rPr lang="en-US" dirty="0"/>
+              <a:t>doesn’t have permissions</a:t>
+            </a:r>
+            <a:br>
+              <a:rPr lang="en-US" dirty="0"/>
+            </a:br>
+            <a:r>
+              <a:rPr lang="en-US" dirty="0"/>
+              <a:t>at Connectivity LZ</a:t>
+            </a:r>
+          </a:p>
+          <a:p>
+            <a:endParaRPr lang="en-US" dirty="0"/>
+          </a:p>
+          <a:p>
+            <a:endParaRPr lang="en-US" dirty="0"/>
+          </a:p>
+        </p:txBody>
+      </p:sp>
+      <p:pic>
+        <p:nvPicPr>
+          <p:cNvPr id="7" name="Google Shape;56;p13">
+            <a:extLst>
+              <a:ext uri="{FF2B5EF4-FFF2-40B4-BE49-F238E27FC236}">
+                <a16:creationId xmlns:a16="http://schemas.microsoft.com/office/drawing/2014/main" id="{89716BFC-D840-66C2-527E-F5D7E2B7572F}"/>
+              </a:ext>
+            </a:extLst>
+          </p:cNvPr>
+          <p:cNvPicPr preferRelativeResize="0"/>
+          <p:nvPr/>
+        </p:nvPicPr>
+        <p:blipFill>
+          <a:blip r:embed="rId3">
+            <a:alphaModFix/>
+          </a:blip>
+          <a:stretch>
+            <a:fillRect/>
+          </a:stretch>
+        </p:blipFill>
+        <p:spPr>
+          <a:xfrm>
+            <a:off x="10989179" y="5736492"/>
+            <a:ext cx="1202821" cy="1121508"/>
+          </a:xfrm>
+          <a:prstGeom prst="rect">
+            <a:avLst/>
+          </a:prstGeom>
+          <a:noFill/>
+          <a:ln>
+            <a:noFill/>
+          </a:ln>
+        </p:spPr>
+      </p:pic>
+      <p:pic>
+        <p:nvPicPr>
+          <p:cNvPr id="8" name="Graphic 7">
+            <a:extLst>
+              <a:ext uri="{FF2B5EF4-FFF2-40B4-BE49-F238E27FC236}">
+                <a16:creationId xmlns:a16="http://schemas.microsoft.com/office/drawing/2014/main" id="{E703B249-F523-B371-2E88-C39AFB58A373}"/>
+              </a:ext>
+            </a:extLst>
+          </p:cNvPr>
+          <p:cNvPicPr>
+            <a:picLocks noChangeAspect="1"/>
+          </p:cNvPicPr>
+          <p:nvPr/>
+        </p:nvPicPr>
+        <p:blipFill>
+          <a:blip r:embed="rId4">
+            <a:extLst>
+              <a:ext uri="{28A0092B-C50C-407E-A947-70E740481C1C}">
+                <a14:useLocalDpi xmlns:a14="http://schemas.microsoft.com/office/drawing/2010/main" val="0"/>
+              </a:ext>
+              <a:ext uri="{96DAC541-7B7A-43D3-8B79-37D633B846F1}">
+                <asvg:svgBlip xmlns:asvg="http://schemas.microsoft.com/office/drawing/2016/SVG/main" r:embed="rId5"/>
+              </a:ext>
+            </a:extLst>
+          </a:blip>
+          <a:stretch>
+            <a:fillRect/>
+          </a:stretch>
+        </p:blipFill>
+        <p:spPr>
+          <a:xfrm>
+            <a:off x="375137" y="6121057"/>
+            <a:ext cx="1718444" cy="574556"/>
+          </a:xfrm>
+          <a:prstGeom prst="rect">
+            <a:avLst/>
+          </a:prstGeom>
+        </p:spPr>
+      </p:pic>
+    </p:spTree>
+    <p:extLst>
+      <p:ext uri="{BB962C8B-B14F-4D97-AF65-F5344CB8AC3E}">
+        <p14:creationId xmlns:p14="http://schemas.microsoft.com/office/powerpoint/2010/main" val="1167624715"/>
+      </p:ext>
+    </p:extLst>
+  </p:cSld>
+  <p:clrMapOvr>
+    <a:masterClrMapping/>
+  </p:clrMapOvr>
+</p:sld>
+</file>
+
+<file path=ppt/slides/slide28.xml><?xml version="1.0" encoding="utf-8"?>
+<p:sld xmlns:a="http://schemas.openxmlformats.org/drawingml/2006/main" xmlns:r="http://schemas.openxmlformats.org/officeDocument/2006/relationships" xmlns:p="http://schemas.openxmlformats.org/presentationml/2006/main">
+  <p:cSld>
+    <p:spTree>
+      <p:nvGrpSpPr>
+        <p:cNvPr id="1" name=""/>
+        <p:cNvGrpSpPr/>
+        <p:nvPr/>
+      </p:nvGrpSpPr>
+      <p:grpSpPr>
+        <a:xfrm>
+          <a:off x="0" y="0"/>
+          <a:ext cx="0" cy="0"/>
+          <a:chOff x="0" y="0"/>
+          <a:chExt cx="0" cy="0"/>
+        </a:xfrm>
+      </p:grpSpPr>
+      <p:sp>
+        <p:nvSpPr>
+          <p:cNvPr id="4" name="Title 1">
+            <a:extLst>
+              <a:ext uri="{FF2B5EF4-FFF2-40B4-BE49-F238E27FC236}">
+                <a16:creationId xmlns:a16="http://schemas.microsoft.com/office/drawing/2014/main" id="{AA31DCC8-DBC5-E954-D8B7-3C7891537C21}"/>
+              </a:ext>
+            </a:extLst>
+          </p:cNvPr>
+          <p:cNvSpPr>
+            <a:spLocks noGrp="1"/>
+          </p:cNvSpPr>
+          <p:nvPr/>
+        </p:nvSpPr>
+        <p:spPr>
+          <a:xfrm>
+            <a:off x="419100" y="523081"/>
+            <a:ext cx="10515600" cy="1325563"/>
+          </a:xfrm>
+          <a:prstGeom prst="rect">
+            <a:avLst/>
+          </a:prstGeom>
+        </p:spPr>
+        <p:txBody>
+          <a:bodyPr vert="horz" lIns="91440" tIns="45720" rIns="91440" bIns="45720" rtlCol="0" anchor="ctr">
+            <a:normAutofit/>
+          </a:bodyPr>
+          <a:lstStyle>
+            <a:lvl1pPr algn="l" defTabSz="914400" rtl="0" eaLnBrk="1" latinLnBrk="0" hangingPunct="1">
+              <a:lnSpc>
+                <a:spcPct val="90000"/>
+              </a:lnSpc>
+              <a:spcBef>
+                <a:spcPct val="0"/>
+              </a:spcBef>
+              <a:buNone/>
+              <a:defRPr sz="4400" kern="1200">
+                <a:solidFill>
+                  <a:schemeClr val="tx1"/>
+                </a:solidFill>
+                <a:latin typeface="+mj-lt"/>
+                <a:ea typeface="+mj-ea"/>
+                <a:cs typeface="+mj-cs"/>
+              </a:defRPr>
+            </a:lvl1pPr>
+          </a:lstStyle>
+          <a:p>
+            <a:r>
+              <a:rPr lang="nb-NO" dirty="0" err="1"/>
+              <a:t>Governance</a:t>
+            </a:r>
+            <a:r>
+              <a:rPr lang="nb-NO" dirty="0"/>
+              <a:t> : </a:t>
+            </a:r>
+            <a:r>
+              <a:rPr lang="nb-NO" dirty="0" err="1"/>
+              <a:t>Azure</a:t>
+            </a:r>
+            <a:r>
+              <a:rPr lang="nb-NO" dirty="0"/>
+              <a:t> Policy</a:t>
+            </a:r>
+          </a:p>
+        </p:txBody>
+      </p:sp>
+      <p:sp>
+        <p:nvSpPr>
+          <p:cNvPr id="5" name="Content Placeholder 2">
+            <a:extLst>
+              <a:ext uri="{FF2B5EF4-FFF2-40B4-BE49-F238E27FC236}">
+                <a16:creationId xmlns:a16="http://schemas.microsoft.com/office/drawing/2014/main" id="{A203090E-1681-4B5F-8095-71944D207162}"/>
+              </a:ext>
+            </a:extLst>
+          </p:cNvPr>
+          <p:cNvSpPr>
+            <a:spLocks noGrp="1"/>
+          </p:cNvSpPr>
+          <p:nvPr/>
+        </p:nvSpPr>
+        <p:spPr>
+          <a:xfrm>
+            <a:off x="419100" y="1983581"/>
+            <a:ext cx="5257800" cy="4351338"/>
+          </a:xfrm>
+          <a:prstGeom prst="rect">
+            <a:avLst/>
+          </a:prstGeom>
+        </p:spPr>
+        <p:txBody>
+          <a:bodyPr vert="horz" lIns="91440" tIns="45720" rIns="91440" bIns="45720" rtlCol="0">
+            <a:normAutofit/>
+          </a:bodyPr>
+          <a:lstStyle>
+            <a:lvl1pPr marL="228600" indent="-228600" algn="l" defTabSz="914400" rtl="0" eaLnBrk="1" latinLnBrk="0" hangingPunct="1">
+              <a:lnSpc>
+                <a:spcPct val="90000"/>
+              </a:lnSpc>
+              <a:spcBef>
+                <a:spcPts val="1000"/>
+              </a:spcBef>
+              <a:buFont typeface="Arial" panose="020B0604020202020204" pitchFamily="34" charset="0"/>
+              <a:buChar char="•"/>
+              <a:defRPr sz="2800" kern="1200">
+                <a:solidFill>
+                  <a:schemeClr val="tx1"/>
+                </a:solidFill>
+                <a:latin typeface="+mn-lt"/>
+                <a:ea typeface="+mn-ea"/>
+                <a:cs typeface="+mn-cs"/>
+              </a:defRPr>
+            </a:lvl1pPr>
+            <a:lvl2pPr marL="685800" indent="-228600" algn="l" defTabSz="914400" rtl="0" eaLnBrk="1" latinLnBrk="0" hangingPunct="1">
+              <a:lnSpc>
+                <a:spcPct val="90000"/>
+              </a:lnSpc>
+              <a:spcBef>
+                <a:spcPts val="500"/>
+              </a:spcBef>
+              <a:buFont typeface="Arial" panose="020B0604020202020204" pitchFamily="34" charset="0"/>
+              <a:buChar char="•"/>
+              <a:defRPr sz="2400" kern="1200">
+                <a:solidFill>
+                  <a:schemeClr val="tx1"/>
+                </a:solidFill>
+                <a:latin typeface="+mn-lt"/>
+                <a:ea typeface="+mn-ea"/>
+                <a:cs typeface="+mn-cs"/>
+              </a:defRPr>
+            </a:lvl2pPr>
+            <a:lvl3pPr marL="1143000" indent="-228600" algn="l" defTabSz="914400" rtl="0" eaLnBrk="1" latinLnBrk="0" hangingPunct="1">
+              <a:lnSpc>
+                <a:spcPct val="90000"/>
+              </a:lnSpc>
+              <a:spcBef>
+                <a:spcPts val="500"/>
+              </a:spcBef>
+              <a:buFont typeface="Arial" panose="020B0604020202020204" pitchFamily="34" charset="0"/>
+              <a:buChar char="•"/>
+              <a:defRPr sz="2000" kern="1200">
+                <a:solidFill>
+                  <a:schemeClr val="tx1"/>
+                </a:solidFill>
+                <a:latin typeface="+mn-lt"/>
+                <a:ea typeface="+mn-ea"/>
+                <a:cs typeface="+mn-cs"/>
+              </a:defRPr>
+            </a:lvl3pPr>
+            <a:lvl4pPr marL="1600200" indent="-228600" algn="l" defTabSz="914400" rtl="0" eaLnBrk="1" latinLnBrk="0" hangingPunct="1">
+              <a:lnSpc>
+                <a:spcPct val="90000"/>
+              </a:lnSpc>
+              <a:spcBef>
+                <a:spcPts val="500"/>
+              </a:spcBef>
+              <a:buFont typeface="Arial" panose="020B0604020202020204" pitchFamily="34" charset="0"/>
+              <a:buChar char="•"/>
+              <a:defRPr sz="1800" kern="1200">
+                <a:solidFill>
+                  <a:schemeClr val="tx1"/>
+                </a:solidFill>
+                <a:latin typeface="+mn-lt"/>
+                <a:ea typeface="+mn-ea"/>
+                <a:cs typeface="+mn-cs"/>
+              </a:defRPr>
+            </a:lvl4pPr>
+            <a:lvl5pPr marL="2057400" indent="-228600" algn="l" defTabSz="914400" rtl="0" eaLnBrk="1" latinLnBrk="0" hangingPunct="1">
+              <a:lnSpc>
+                <a:spcPct val="90000"/>
+              </a:lnSpc>
+              <a:spcBef>
+                <a:spcPts val="500"/>
+              </a:spcBef>
+              <a:buFont typeface="Arial" panose="020B0604020202020204" pitchFamily="34" charset="0"/>
+              <a:buChar char="•"/>
+              <a:defRPr sz="1800" kern="1200">
+                <a:solidFill>
+                  <a:schemeClr val="tx1"/>
+                </a:solidFill>
+                <a:latin typeface="+mn-lt"/>
+                <a:ea typeface="+mn-ea"/>
+                <a:cs typeface="+mn-cs"/>
+              </a:defRPr>
+            </a:lvl5pPr>
+            <a:lvl6pPr marL="2514600" indent="-228600" algn="l" defTabSz="914400" rtl="0" eaLnBrk="1" latinLnBrk="0" hangingPunct="1">
+              <a:lnSpc>
+                <a:spcPct val="90000"/>
+              </a:lnSpc>
+              <a:spcBef>
+                <a:spcPts val="500"/>
+              </a:spcBef>
+              <a:buFont typeface="Arial" panose="020B0604020202020204" pitchFamily="34" charset="0"/>
+              <a:buChar char="•"/>
+              <a:defRPr sz="1800" kern="1200">
+                <a:solidFill>
+                  <a:schemeClr val="tx1"/>
+                </a:solidFill>
+                <a:latin typeface="+mn-lt"/>
+                <a:ea typeface="+mn-ea"/>
+                <a:cs typeface="+mn-cs"/>
+              </a:defRPr>
+            </a:lvl6pPr>
+            <a:lvl7pPr marL="2971800" indent="-228600" algn="l" defTabSz="914400" rtl="0" eaLnBrk="1" latinLnBrk="0" hangingPunct="1">
+              <a:lnSpc>
+                <a:spcPct val="90000"/>
+              </a:lnSpc>
+              <a:spcBef>
+                <a:spcPts val="500"/>
+              </a:spcBef>
+              <a:buFont typeface="Arial" panose="020B0604020202020204" pitchFamily="34" charset="0"/>
+              <a:buChar char="•"/>
+              <a:defRPr sz="1800" kern="1200">
+                <a:solidFill>
+                  <a:schemeClr val="tx1"/>
+                </a:solidFill>
+                <a:latin typeface="+mn-lt"/>
+                <a:ea typeface="+mn-ea"/>
+                <a:cs typeface="+mn-cs"/>
+              </a:defRPr>
+            </a:lvl7pPr>
+            <a:lvl8pPr marL="3429000" indent="-228600" algn="l" defTabSz="914400" rtl="0" eaLnBrk="1" latinLnBrk="0" hangingPunct="1">
+              <a:lnSpc>
+                <a:spcPct val="90000"/>
+              </a:lnSpc>
+              <a:spcBef>
+                <a:spcPts val="500"/>
+              </a:spcBef>
+              <a:buFont typeface="Arial" panose="020B0604020202020204" pitchFamily="34" charset="0"/>
+              <a:buChar char="•"/>
+              <a:defRPr sz="1800" kern="1200">
+                <a:solidFill>
+                  <a:schemeClr val="tx1"/>
+                </a:solidFill>
+                <a:latin typeface="+mn-lt"/>
+                <a:ea typeface="+mn-ea"/>
+                <a:cs typeface="+mn-cs"/>
+              </a:defRPr>
+            </a:lvl8pPr>
+            <a:lvl9pPr marL="3886200" indent="-228600" algn="l" defTabSz="914400" rtl="0" eaLnBrk="1" latinLnBrk="0" hangingPunct="1">
+              <a:lnSpc>
+                <a:spcPct val="90000"/>
+              </a:lnSpc>
+              <a:spcBef>
+                <a:spcPts val="500"/>
+              </a:spcBef>
+              <a:buFont typeface="Arial" panose="020B0604020202020204" pitchFamily="34" charset="0"/>
+              <a:buChar char="•"/>
+              <a:defRPr sz="1800" kern="1200">
+                <a:solidFill>
+                  <a:schemeClr val="tx1"/>
+                </a:solidFill>
+                <a:latin typeface="+mn-lt"/>
+                <a:ea typeface="+mn-ea"/>
+                <a:cs typeface="+mn-cs"/>
+              </a:defRPr>
+            </a:lvl9pPr>
+          </a:lstStyle>
+          <a:p>
+            <a:r>
+              <a:rPr lang="nb-NO" dirty="0" err="1"/>
+              <a:t>Evaluates</a:t>
+            </a:r>
+            <a:r>
+              <a:rPr lang="nb-NO" dirty="0"/>
+              <a:t> </a:t>
+            </a:r>
+            <a:r>
+              <a:rPr lang="nb-NO" dirty="0" err="1"/>
+              <a:t>resources</a:t>
+            </a:r>
+            <a:r>
+              <a:rPr lang="nb-NO" dirty="0"/>
+              <a:t> and </a:t>
+            </a:r>
+            <a:r>
+              <a:rPr lang="nb-NO" dirty="0" err="1"/>
+              <a:t>actions</a:t>
+            </a:r>
+            <a:endParaRPr lang="nb-NO" dirty="0"/>
+          </a:p>
+          <a:p>
+            <a:r>
+              <a:rPr lang="nb-NO" dirty="0" err="1"/>
+              <a:t>Compares</a:t>
+            </a:r>
+            <a:r>
+              <a:rPr lang="nb-NO" dirty="0"/>
+              <a:t> </a:t>
+            </a:r>
+            <a:r>
+              <a:rPr lang="nb-NO" dirty="0" err="1"/>
+              <a:t>properties</a:t>
+            </a:r>
+            <a:r>
+              <a:rPr lang="nb-NO" dirty="0"/>
+              <a:t> </a:t>
+            </a:r>
+            <a:r>
+              <a:rPr lang="nb-NO" dirty="0" err="1"/>
+              <a:t>of</a:t>
+            </a:r>
+            <a:r>
+              <a:rPr lang="nb-NO" dirty="0"/>
+              <a:t> </a:t>
+            </a:r>
+            <a:r>
+              <a:rPr lang="nb-NO" dirty="0" err="1"/>
+              <a:t>the</a:t>
+            </a:r>
+            <a:r>
+              <a:rPr lang="nb-NO" dirty="0"/>
+              <a:t> </a:t>
+            </a:r>
+            <a:r>
+              <a:rPr lang="nb-NO" dirty="0" err="1"/>
+              <a:t>resourse</a:t>
+            </a:r>
+            <a:r>
+              <a:rPr lang="nb-NO" dirty="0"/>
+              <a:t> to </a:t>
+            </a:r>
+            <a:r>
+              <a:rPr lang="nb-NO" dirty="0" err="1"/>
+              <a:t>rules</a:t>
+            </a:r>
+            <a:endParaRPr lang="nb-NO" dirty="0"/>
+          </a:p>
+          <a:p>
+            <a:r>
+              <a:rPr lang="nb-NO" dirty="0"/>
+              <a:t>Rules </a:t>
+            </a:r>
+            <a:r>
+              <a:rPr lang="nb-NO" dirty="0" err="1"/>
+              <a:t>are</a:t>
+            </a:r>
+            <a:r>
+              <a:rPr lang="nb-NO" dirty="0"/>
+              <a:t> JSON </a:t>
+            </a:r>
+          </a:p>
+          <a:p>
+            <a:r>
+              <a:rPr lang="nb-NO" dirty="0"/>
+              <a:t>Policy </a:t>
+            </a:r>
+            <a:r>
+              <a:rPr lang="nb-NO" dirty="0" err="1"/>
+              <a:t>effects</a:t>
+            </a:r>
+            <a:r>
+              <a:rPr lang="nb-NO" dirty="0"/>
+              <a:t> (not </a:t>
+            </a:r>
+            <a:r>
+              <a:rPr lang="nb-NO" dirty="0" err="1"/>
+              <a:t>completed</a:t>
+            </a:r>
+            <a:r>
+              <a:rPr lang="nb-NO" dirty="0"/>
+              <a:t>):</a:t>
+            </a:r>
+          </a:p>
+          <a:p>
+            <a:pPr lvl="1"/>
+            <a:r>
+              <a:rPr lang="nb-NO" dirty="0" err="1"/>
+              <a:t>Deny</a:t>
+            </a:r>
+            <a:endParaRPr lang="nb-NO" dirty="0"/>
+          </a:p>
+          <a:p>
+            <a:pPr lvl="1"/>
+            <a:r>
+              <a:rPr lang="nb-NO" dirty="0" err="1"/>
+              <a:t>Audit</a:t>
+            </a:r>
+            <a:endParaRPr lang="nb-NO" dirty="0"/>
+          </a:p>
+          <a:p>
+            <a:pPr lvl="1"/>
+            <a:r>
+              <a:rPr lang="nb-NO" dirty="0" err="1"/>
+              <a:t>DeployIfNotExists</a:t>
+            </a:r>
+            <a:endParaRPr lang="nb-NO" dirty="0"/>
+          </a:p>
+          <a:p>
+            <a:pPr lvl="1"/>
+            <a:r>
+              <a:rPr lang="nb-NO" dirty="0" err="1"/>
+              <a:t>Modify</a:t>
+            </a:r>
+            <a:endParaRPr lang="nb-NO" dirty="0"/>
+          </a:p>
+        </p:txBody>
+      </p:sp>
+      <p:pic>
+        <p:nvPicPr>
+          <p:cNvPr id="6" name="Picture 5">
+            <a:extLst>
+              <a:ext uri="{FF2B5EF4-FFF2-40B4-BE49-F238E27FC236}">
+                <a16:creationId xmlns:a16="http://schemas.microsoft.com/office/drawing/2014/main" id="{4D38A004-386B-6F48-F927-5B9082F1E988}"/>
               </a:ext>
             </a:extLst>
           </p:cNvPr>
@@ -13628,8 +14649,8 @@
         </p:blipFill>
         <p:spPr>
           <a:xfrm>
-            <a:off x="2678915" y="1014786"/>
-            <a:ext cx="6527731" cy="4684974"/>
+            <a:off x="5573874" y="2222057"/>
+            <a:ext cx="6199026" cy="3437414"/>
           </a:xfrm>
           <a:prstGeom prst="rect">
             <a:avLst/>
@@ -13638,10 +14659,10 @@
       </p:pic>
       <p:pic>
         <p:nvPicPr>
-          <p:cNvPr id="4" name="Graphic 4">
-            <a:extLst>
-              <a:ext uri="{FF2B5EF4-FFF2-40B4-BE49-F238E27FC236}">
-                <a16:creationId xmlns:a16="http://schemas.microsoft.com/office/drawing/2014/main" id="{0DFA98A8-5A4D-49E4-832A-BB2FD120FBC7}"/>
+          <p:cNvPr id="7" name="Graphic 3">
+            <a:extLst>
+              <a:ext uri="{FF2B5EF4-FFF2-40B4-BE49-F238E27FC236}">
+                <a16:creationId xmlns:a16="http://schemas.microsoft.com/office/drawing/2014/main" id="{92154FB9-BA8E-B603-D784-954C6EB1A0E9}"/>
               </a:ext>
             </a:extLst>
           </p:cNvPr>
@@ -13667,8 +14688,8 @@
         </p:blipFill>
         <p:spPr>
           <a:xfrm>
-            <a:off x="375137" y="6121057"/>
-            <a:ext cx="1718444" cy="574556"/>
+            <a:off x="10590462" y="702752"/>
+            <a:ext cx="688475" cy="688475"/>
           </a:xfrm>
           <a:prstGeom prst="rect">
             <a:avLst/>
@@ -13677,10 +14698,10 @@
       </p:pic>
       <p:pic>
         <p:nvPicPr>
-          <p:cNvPr id="5" name="Google Shape;56;p13">
-            <a:extLst>
-              <a:ext uri="{FF2B5EF4-FFF2-40B4-BE49-F238E27FC236}">
-                <a16:creationId xmlns:a16="http://schemas.microsoft.com/office/drawing/2014/main" id="{0A29C5F4-A042-4CF1-B499-7EC5D0A4F145}"/>
+          <p:cNvPr id="8" name="Google Shape;56;p13">
+            <a:extLst>
+              <a:ext uri="{FF2B5EF4-FFF2-40B4-BE49-F238E27FC236}">
+                <a16:creationId xmlns:a16="http://schemas.microsoft.com/office/drawing/2014/main" id="{7202D3A6-7BDB-39E2-07F1-0D6D4F4219CE}"/>
               </a:ext>
             </a:extLst>
           </p:cNvPr>
@@ -13709,10 +14730,167 @@
           </a:ln>
         </p:spPr>
       </p:pic>
+      <p:pic>
+        <p:nvPicPr>
+          <p:cNvPr id="9" name="Graphic 8">
+            <a:extLst>
+              <a:ext uri="{FF2B5EF4-FFF2-40B4-BE49-F238E27FC236}">
+                <a16:creationId xmlns:a16="http://schemas.microsoft.com/office/drawing/2014/main" id="{CC5C011C-E25C-19C2-3057-1FBDEB6EDFF4}"/>
+              </a:ext>
+            </a:extLst>
+          </p:cNvPr>
+          <p:cNvPicPr>
+            <a:picLocks noChangeAspect="1"/>
+          </p:cNvPicPr>
+          <p:nvPr/>
+        </p:nvPicPr>
+        <p:blipFill>
+          <a:blip r:embed="rId7">
+            <a:extLst>
+              <a:ext uri="{28A0092B-C50C-407E-A947-70E740481C1C}">
+                <a14:useLocalDpi xmlns:a14="http://schemas.microsoft.com/office/drawing/2010/main" val="0"/>
+              </a:ext>
+              <a:ext uri="{96DAC541-7B7A-43D3-8B79-37D633B846F1}">
+                <asvg:svgBlip xmlns:asvg="http://schemas.microsoft.com/office/drawing/2016/SVG/main" r:embed="rId8"/>
+              </a:ext>
+            </a:extLst>
+          </a:blip>
+          <a:stretch>
+            <a:fillRect/>
+          </a:stretch>
+        </p:blipFill>
+        <p:spPr>
+          <a:xfrm>
+            <a:off x="375137" y="6121057"/>
+            <a:ext cx="1718444" cy="574556"/>
+          </a:xfrm>
+          <a:prstGeom prst="rect">
+            <a:avLst/>
+          </a:prstGeom>
+        </p:spPr>
+      </p:pic>
     </p:spTree>
     <p:extLst>
       <p:ext uri="{BB962C8B-B14F-4D97-AF65-F5344CB8AC3E}">
-        <p14:creationId xmlns:p14="http://schemas.microsoft.com/office/powerpoint/2010/main" val="3340194559"/>
+        <p14:creationId xmlns:p14="http://schemas.microsoft.com/office/powerpoint/2010/main" val="4264003894"/>
+      </p:ext>
+    </p:extLst>
+  </p:cSld>
+  <p:clrMapOvr>
+    <a:masterClrMapping/>
+  </p:clrMapOvr>
+</p:sld>
+</file>
+
+<file path=ppt/slides/slide29.xml><?xml version="1.0" encoding="utf-8"?>
+<p:sld xmlns:a="http://schemas.openxmlformats.org/drawingml/2006/main" xmlns:r="http://schemas.openxmlformats.org/officeDocument/2006/relationships" xmlns:p="http://schemas.openxmlformats.org/presentationml/2006/main">
+  <p:cSld>
+    <p:spTree>
+      <p:nvGrpSpPr>
+        <p:cNvPr id="1" name=""/>
+        <p:cNvGrpSpPr/>
+        <p:nvPr/>
+      </p:nvGrpSpPr>
+      <p:grpSpPr>
+        <a:xfrm>
+          <a:off x="0" y="0"/>
+          <a:ext cx="0" cy="0"/>
+          <a:chOff x="0" y="0"/>
+          <a:chExt cx="0" cy="0"/>
+        </a:xfrm>
+      </p:grpSpPr>
+      <p:sp>
+        <p:nvSpPr>
+          <p:cNvPr id="2" name="Title 1">
+            <a:extLst>
+              <a:ext uri="{FF2B5EF4-FFF2-40B4-BE49-F238E27FC236}">
+                <a16:creationId xmlns:a16="http://schemas.microsoft.com/office/drawing/2014/main" id="{46B6DF40-BFCB-AFB0-94A5-19AD4DFACB99}"/>
+              </a:ext>
+            </a:extLst>
+          </p:cNvPr>
+          <p:cNvSpPr>
+            <a:spLocks noGrp="1"/>
+          </p:cNvSpPr>
+          <p:nvPr>
+            <p:ph type="title"/>
+          </p:nvPr>
+        </p:nvSpPr>
+        <p:spPr/>
+        <p:txBody>
+          <a:bodyPr/>
+          <a:lstStyle/>
+          <a:p>
+            <a:r>
+              <a:rPr lang="en-US" dirty="0"/>
+              <a:t>Deploy Storage Account Blob Private Endpoint DNS Record Policy</a:t>
+            </a:r>
+          </a:p>
+        </p:txBody>
+      </p:sp>
+      <p:pic>
+        <p:nvPicPr>
+          <p:cNvPr id="5" name="Picture 4">
+            <a:extLst>
+              <a:ext uri="{FF2B5EF4-FFF2-40B4-BE49-F238E27FC236}">
+                <a16:creationId xmlns:a16="http://schemas.microsoft.com/office/drawing/2014/main" id="{70141492-7A45-0C22-78A8-C23709DD8287}"/>
+              </a:ext>
+            </a:extLst>
+          </p:cNvPr>
+          <p:cNvPicPr>
+            <a:picLocks noChangeAspect="1"/>
+          </p:cNvPicPr>
+          <p:nvPr/>
+        </p:nvPicPr>
+        <p:blipFill>
+          <a:blip r:embed="rId2"/>
+          <a:stretch>
+            <a:fillRect/>
+          </a:stretch>
+        </p:blipFill>
+        <p:spPr>
+          <a:xfrm>
+            <a:off x="415600" y="2154813"/>
+            <a:ext cx="6028743" cy="2523119"/>
+          </a:xfrm>
+          <a:prstGeom prst="rect">
+            <a:avLst/>
+          </a:prstGeom>
+        </p:spPr>
+      </p:pic>
+      <p:pic>
+        <p:nvPicPr>
+          <p:cNvPr id="7" name="Picture 6">
+            <a:extLst>
+              <a:ext uri="{FF2B5EF4-FFF2-40B4-BE49-F238E27FC236}">
+                <a16:creationId xmlns:a16="http://schemas.microsoft.com/office/drawing/2014/main" id="{2FCE5458-AF3C-440E-13D8-4B9011F8CD95}"/>
+              </a:ext>
+            </a:extLst>
+          </p:cNvPr>
+          <p:cNvPicPr>
+            <a:picLocks noChangeAspect="1"/>
+          </p:cNvPicPr>
+          <p:nvPr/>
+        </p:nvPicPr>
+        <p:blipFill>
+          <a:blip r:embed="rId3"/>
+          <a:stretch>
+            <a:fillRect/>
+          </a:stretch>
+        </p:blipFill>
+        <p:spPr>
+          <a:xfrm>
+            <a:off x="6514011" y="3724462"/>
+            <a:ext cx="5617029" cy="2994201"/>
+          </a:xfrm>
+          <a:prstGeom prst="rect">
+            <a:avLst/>
+          </a:prstGeom>
+        </p:spPr>
+      </p:pic>
+    </p:spTree>
+    <p:extLst>
+      <p:ext uri="{BB962C8B-B14F-4D97-AF65-F5344CB8AC3E}">
+        <p14:creationId xmlns:p14="http://schemas.microsoft.com/office/powerpoint/2010/main" val="4004805574"/>
       </p:ext>
     </p:extLst>
   </p:cSld>
@@ -13946,6 +15124,301 @@
     <p:extLst>
       <p:ext uri="{BB962C8B-B14F-4D97-AF65-F5344CB8AC3E}">
         <p14:creationId xmlns:p14="http://schemas.microsoft.com/office/powerpoint/2010/main" val="4114130333"/>
+      </p:ext>
+    </p:extLst>
+  </p:cSld>
+  <p:clrMapOvr>
+    <a:masterClrMapping/>
+  </p:clrMapOvr>
+</p:sld>
+</file>
+
+<file path=ppt/slides/slide30.xml><?xml version="1.0" encoding="utf-8"?>
+<p:sld xmlns:a="http://schemas.openxmlformats.org/drawingml/2006/main" xmlns:r="http://schemas.openxmlformats.org/officeDocument/2006/relationships" xmlns:p="http://schemas.openxmlformats.org/presentationml/2006/main">
+  <p:cSld>
+    <p:spTree>
+      <p:nvGrpSpPr>
+        <p:cNvPr id="1" name=""/>
+        <p:cNvGrpSpPr/>
+        <p:nvPr/>
+      </p:nvGrpSpPr>
+      <p:grpSpPr>
+        <a:xfrm>
+          <a:off x="0" y="0"/>
+          <a:ext cx="0" cy="0"/>
+          <a:chOff x="0" y="0"/>
+          <a:chExt cx="0" cy="0"/>
+        </a:xfrm>
+      </p:grpSpPr>
+      <p:sp>
+        <p:nvSpPr>
+          <p:cNvPr id="2" name="Title 1">
+            <a:extLst>
+              <a:ext uri="{FF2B5EF4-FFF2-40B4-BE49-F238E27FC236}">
+                <a16:creationId xmlns:a16="http://schemas.microsoft.com/office/drawing/2014/main" id="{E35F925F-7C4B-9A04-FAEC-3268DD70660D}"/>
+              </a:ext>
+            </a:extLst>
+          </p:cNvPr>
+          <p:cNvSpPr>
+            <a:spLocks noGrp="1"/>
+          </p:cNvSpPr>
+          <p:nvPr>
+            <p:ph type="title"/>
+          </p:nvPr>
+        </p:nvSpPr>
+        <p:spPr/>
+        <p:txBody>
+          <a:bodyPr/>
+          <a:lstStyle/>
+          <a:p>
+            <a:r>
+              <a:rPr lang="nb-NO" dirty="0"/>
+              <a:t>Labs</a:t>
+            </a:r>
+            <a:endParaRPr lang="en-US" dirty="0"/>
+          </a:p>
+        </p:txBody>
+      </p:sp>
+      <p:pic>
+        <p:nvPicPr>
+          <p:cNvPr id="5" name="Picture 4">
+            <a:extLst>
+              <a:ext uri="{FF2B5EF4-FFF2-40B4-BE49-F238E27FC236}">
+                <a16:creationId xmlns:a16="http://schemas.microsoft.com/office/drawing/2014/main" id="{AFD38941-BF4D-9F3F-7965-86DADBD63EFA}"/>
+              </a:ext>
+            </a:extLst>
+          </p:cNvPr>
+          <p:cNvPicPr>
+            <a:picLocks noChangeAspect="1"/>
+          </p:cNvPicPr>
+          <p:nvPr/>
+        </p:nvPicPr>
+        <p:blipFill>
+          <a:blip r:embed="rId2"/>
+          <a:stretch>
+            <a:fillRect/>
+          </a:stretch>
+        </p:blipFill>
+        <p:spPr>
+          <a:xfrm>
+            <a:off x="0" y="1555400"/>
+            <a:ext cx="11991416" cy="4461578"/>
+          </a:xfrm>
+          <a:prstGeom prst="rect">
+            <a:avLst/>
+          </a:prstGeom>
+        </p:spPr>
+      </p:pic>
+      <p:pic>
+        <p:nvPicPr>
+          <p:cNvPr id="3" name="Google Shape;56;p13">
+            <a:extLst>
+              <a:ext uri="{FF2B5EF4-FFF2-40B4-BE49-F238E27FC236}">
+                <a16:creationId xmlns:a16="http://schemas.microsoft.com/office/drawing/2014/main" id="{784183D5-F0A0-38CD-1AA1-AB743AA06EEC}"/>
+              </a:ext>
+            </a:extLst>
+          </p:cNvPr>
+          <p:cNvPicPr preferRelativeResize="0"/>
+          <p:nvPr/>
+        </p:nvPicPr>
+        <p:blipFill>
+          <a:blip r:embed="rId3">
+            <a:alphaModFix/>
+          </a:blip>
+          <a:stretch>
+            <a:fillRect/>
+          </a:stretch>
+        </p:blipFill>
+        <p:spPr>
+          <a:xfrm>
+            <a:off x="10989179" y="5736492"/>
+            <a:ext cx="1202821" cy="1121508"/>
+          </a:xfrm>
+          <a:prstGeom prst="rect">
+            <a:avLst/>
+          </a:prstGeom>
+          <a:noFill/>
+          <a:ln>
+            <a:noFill/>
+          </a:ln>
+        </p:spPr>
+      </p:pic>
+      <p:pic>
+        <p:nvPicPr>
+          <p:cNvPr id="4" name="Graphic 3">
+            <a:extLst>
+              <a:ext uri="{FF2B5EF4-FFF2-40B4-BE49-F238E27FC236}">
+                <a16:creationId xmlns:a16="http://schemas.microsoft.com/office/drawing/2014/main" id="{528180BB-A110-6A23-58EF-D986D1A6171B}"/>
+              </a:ext>
+            </a:extLst>
+          </p:cNvPr>
+          <p:cNvPicPr>
+            <a:picLocks noChangeAspect="1"/>
+          </p:cNvPicPr>
+          <p:nvPr/>
+        </p:nvPicPr>
+        <p:blipFill>
+          <a:blip r:embed="rId4">
+            <a:extLst>
+              <a:ext uri="{28A0092B-C50C-407E-A947-70E740481C1C}">
+                <a14:useLocalDpi xmlns:a14="http://schemas.microsoft.com/office/drawing/2010/main" val="0"/>
+              </a:ext>
+              <a:ext uri="{96DAC541-7B7A-43D3-8B79-37D633B846F1}">
+                <asvg:svgBlip xmlns:asvg="http://schemas.microsoft.com/office/drawing/2016/SVG/main" r:embed="rId5"/>
+              </a:ext>
+            </a:extLst>
+          </a:blip>
+          <a:stretch>
+            <a:fillRect/>
+          </a:stretch>
+        </p:blipFill>
+        <p:spPr>
+          <a:xfrm>
+            <a:off x="375137" y="6121057"/>
+            <a:ext cx="1718444" cy="574556"/>
+          </a:xfrm>
+          <a:prstGeom prst="rect">
+            <a:avLst/>
+          </a:prstGeom>
+        </p:spPr>
+      </p:pic>
+    </p:spTree>
+    <p:extLst>
+      <p:ext uri="{BB962C8B-B14F-4D97-AF65-F5344CB8AC3E}">
+        <p14:creationId xmlns:p14="http://schemas.microsoft.com/office/powerpoint/2010/main" val="1758931061"/>
+      </p:ext>
+    </p:extLst>
+  </p:cSld>
+  <p:clrMapOvr>
+    <a:masterClrMapping/>
+  </p:clrMapOvr>
+</p:sld>
+</file>
+
+<file path=ppt/slides/slide31.xml><?xml version="1.0" encoding="utf-8"?>
+<p:sld xmlns:a="http://schemas.openxmlformats.org/drawingml/2006/main" xmlns:r="http://schemas.openxmlformats.org/officeDocument/2006/relationships" xmlns:p="http://schemas.openxmlformats.org/presentationml/2006/main">
+  <p:cSld>
+    <p:spTree>
+      <p:nvGrpSpPr>
+        <p:cNvPr id="1" name=""/>
+        <p:cNvGrpSpPr/>
+        <p:nvPr/>
+      </p:nvGrpSpPr>
+      <p:grpSpPr>
+        <a:xfrm>
+          <a:off x="0" y="0"/>
+          <a:ext cx="0" cy="0"/>
+          <a:chOff x="0" y="0"/>
+          <a:chExt cx="0" cy="0"/>
+        </a:xfrm>
+      </p:grpSpPr>
+      <p:pic>
+        <p:nvPicPr>
+          <p:cNvPr id="3" name="Picture 2">
+            <a:extLst>
+              <a:ext uri="{FF2B5EF4-FFF2-40B4-BE49-F238E27FC236}">
+                <a16:creationId xmlns:a16="http://schemas.microsoft.com/office/drawing/2014/main" id="{CFAD4C39-42D6-45D1-9E0D-E17B5050B154}"/>
+              </a:ext>
+            </a:extLst>
+          </p:cNvPr>
+          <p:cNvPicPr>
+            <a:picLocks noChangeAspect="1"/>
+          </p:cNvPicPr>
+          <p:nvPr/>
+        </p:nvPicPr>
+        <p:blipFill>
+          <a:blip r:embed="rId3"/>
+          <a:stretch>
+            <a:fillRect/>
+          </a:stretch>
+        </p:blipFill>
+        <p:spPr>
+          <a:xfrm>
+            <a:off x="2678915" y="1014786"/>
+            <a:ext cx="6527731" cy="4684974"/>
+          </a:xfrm>
+          <a:prstGeom prst="rect">
+            <a:avLst/>
+          </a:prstGeom>
+        </p:spPr>
+      </p:pic>
+      <p:pic>
+        <p:nvPicPr>
+          <p:cNvPr id="4" name="Graphic 4">
+            <a:extLst>
+              <a:ext uri="{FF2B5EF4-FFF2-40B4-BE49-F238E27FC236}">
+                <a16:creationId xmlns:a16="http://schemas.microsoft.com/office/drawing/2014/main" id="{0DFA98A8-5A4D-49E4-832A-BB2FD120FBC7}"/>
+              </a:ext>
+            </a:extLst>
+          </p:cNvPr>
+          <p:cNvPicPr>
+            <a:picLocks noChangeAspect="1"/>
+          </p:cNvPicPr>
+          <p:nvPr/>
+        </p:nvPicPr>
+        <p:blipFill>
+          <a:blip r:embed="rId4">
+            <a:extLst>
+              <a:ext uri="{28A0092B-C50C-407E-A947-70E740481C1C}">
+                <a14:useLocalDpi xmlns:a14="http://schemas.microsoft.com/office/drawing/2010/main" val="0"/>
+              </a:ext>
+              <a:ext uri="{96DAC541-7B7A-43D3-8B79-37D633B846F1}">
+                <asvg:svgBlip xmlns:asvg="http://schemas.microsoft.com/office/drawing/2016/SVG/main" r:embed="rId5"/>
+              </a:ext>
+            </a:extLst>
+          </a:blip>
+          <a:stretch>
+            <a:fillRect/>
+          </a:stretch>
+        </p:blipFill>
+        <p:spPr>
+          <a:xfrm>
+            <a:off x="375137" y="6121057"/>
+            <a:ext cx="1718444" cy="574556"/>
+          </a:xfrm>
+          <a:prstGeom prst="rect">
+            <a:avLst/>
+          </a:prstGeom>
+        </p:spPr>
+      </p:pic>
+      <p:pic>
+        <p:nvPicPr>
+          <p:cNvPr id="5" name="Google Shape;56;p13">
+            <a:extLst>
+              <a:ext uri="{FF2B5EF4-FFF2-40B4-BE49-F238E27FC236}">
+                <a16:creationId xmlns:a16="http://schemas.microsoft.com/office/drawing/2014/main" id="{0A29C5F4-A042-4CF1-B499-7EC5D0A4F145}"/>
+              </a:ext>
+            </a:extLst>
+          </p:cNvPr>
+          <p:cNvPicPr preferRelativeResize="0"/>
+          <p:nvPr/>
+        </p:nvPicPr>
+        <p:blipFill>
+          <a:blip r:embed="rId6">
+            <a:alphaModFix/>
+          </a:blip>
+          <a:stretch>
+            <a:fillRect/>
+          </a:stretch>
+        </p:blipFill>
+        <p:spPr>
+          <a:xfrm>
+            <a:off x="10989179" y="5736492"/>
+            <a:ext cx="1202821" cy="1121508"/>
+          </a:xfrm>
+          <a:prstGeom prst="rect">
+            <a:avLst/>
+          </a:prstGeom>
+          <a:noFill/>
+          <a:ln>
+            <a:noFill/>
+          </a:ln>
+        </p:spPr>
+      </p:pic>
+    </p:spTree>
+    <p:extLst>
+      <p:ext uri="{BB962C8B-B14F-4D97-AF65-F5344CB8AC3E}">
+        <p14:creationId xmlns:p14="http://schemas.microsoft.com/office/powerpoint/2010/main" val="3340194559"/>
       </p:ext>
     </p:extLst>
   </p:cSld>

</xml_diff>